<commit_message>
Update Week 11 Lecture 1 - Sinusoidal Steady State.pptx
</commit_message>
<xml_diff>
--- a/PP WORK/Instructor Version/Week 11/Week 11 Lecture 1 - Sinusoidal Steady State.pptx
+++ b/PP WORK/Instructor Version/Week 11/Week 11 Lecture 1 - Sinusoidal Steady State.pptx
@@ -5,7 +5,7 @@
     <p:sldMasterId id="2147483661" r:id="rId1"/>
   </p:sldMasterIdLst>
   <p:notesMasterIdLst>
-    <p:notesMasterId r:id="rId19"/>
+    <p:notesMasterId r:id="rId20"/>
   </p:notesMasterIdLst>
   <p:sldIdLst>
     <p:sldId id="431" r:id="rId2"/>
@@ -22,9 +22,10 @@
     <p:sldId id="268" r:id="rId13"/>
     <p:sldId id="269" r:id="rId14"/>
     <p:sldId id="270" r:id="rId15"/>
-    <p:sldId id="271" r:id="rId16"/>
-    <p:sldId id="430" r:id="rId17"/>
-    <p:sldId id="273" r:id="rId18"/>
+    <p:sldId id="432" r:id="rId16"/>
+    <p:sldId id="271" r:id="rId17"/>
+    <p:sldId id="430" r:id="rId18"/>
+    <p:sldId id="273" r:id="rId19"/>
   </p:sldIdLst>
   <p:sldSz cx="12192000" cy="6858000"/>
   <p:notesSz cx="6858000" cy="9144000"/>
@@ -125,7 +126,7 @@
   </p:defaultTextStyle>
   <p:extLst>
     <p:ext uri="{EFAFB233-063F-42B5-8137-9DF3F51BA10A}">
-      <p15:sldGuideLst xmlns:p15="http://schemas.microsoft.com/office/powerpoint/2012/main"/>
+      <p15:sldGuideLst xmlns:p15="http://schemas.microsoft.com/office/powerpoint/2012/main" xmlns=""/>
     </p:ext>
   </p:extLst>
 </p:presentation>
@@ -213,7 +214,7 @@
           <a:p>
             <a:fld id="{18AB4343-410D-4114-8175-E2D7C9308D80}" type="datetimeFigureOut">
               <a:rPr lang="en-US" smtClean="0"/>
-              <a:t>12/8/2024</a:t>
+              <a:t>1/17/2025</a:t>
             </a:fld>
             <a:endParaRPr lang="en-US"/>
           </a:p>
@@ -2584,7 +2585,7 @@
           <a:p>
             <a:fld id="{1D8BD707-D9CF-40AE-B4C6-C98DA3205C09}" type="datetimeFigureOut">
               <a:rPr lang="en-US"/>
-              <a:t>12/8/2024</a:t>
+              <a:t>1/17/2025</a:t>
             </a:fld>
             <a:endParaRPr lang="en-US"/>
           </a:p>
@@ -2754,7 +2755,7 @@
           <a:p>
             <a:fld id="{1D8BD707-D9CF-40AE-B4C6-C98DA3205C09}" type="datetimeFigureOut">
               <a:rPr lang="en-US"/>
-              <a:t>12/8/2024</a:t>
+              <a:t>1/17/2025</a:t>
             </a:fld>
             <a:endParaRPr lang="en-US"/>
           </a:p>
@@ -2967,7 +2968,7 @@
           <a:p>
             <a:fld id="{1D8BD707-D9CF-40AE-B4C6-C98DA3205C09}" type="datetimeFigureOut">
               <a:rPr lang="en-US"/>
-              <a:t>12/8/2024</a:t>
+              <a:t>1/17/2025</a:t>
             </a:fld>
             <a:endParaRPr lang="en-US"/>
           </a:p>
@@ -3114,7 +3115,7 @@
           <a:p>
             <a:fld id="{1D8BD707-D9CF-40AE-B4C6-C98DA3205C09}" type="datetimeFigureOut">
               <a:rPr lang="en-US"/>
-              <a:t>12/8/2024</a:t>
+              <a:t>1/17/2025</a:t>
             </a:fld>
             <a:endParaRPr lang="en-US"/>
           </a:p>
@@ -3187,7 +3188,7 @@
           <p:cNvPr id="2" name="Title 1">
             <a:extLst>
               <a:ext uri="{FF2B5EF4-FFF2-40B4-BE49-F238E27FC236}">
-                <a16:creationId xmlns:a16="http://schemas.microsoft.com/office/drawing/2014/main" id="{8267C4E5-55F7-DB05-186B-06791E1D1784}"/>
+                <a16:creationId xmlns:a16="http://schemas.microsoft.com/office/drawing/2014/main" xmlns="" id="{8267C4E5-55F7-DB05-186B-06791E1D1784}"/>
               </a:ext>
             </a:extLst>
           </p:cNvPr>
@@ -3216,7 +3217,7 @@
           <p:cNvPr id="3" name="Footer Placeholder 2">
             <a:extLst>
               <a:ext uri="{FF2B5EF4-FFF2-40B4-BE49-F238E27FC236}">
-                <a16:creationId xmlns:a16="http://schemas.microsoft.com/office/drawing/2014/main" id="{B3AA35ED-DF99-6958-28FA-33A93BB97722}"/>
+                <a16:creationId xmlns:a16="http://schemas.microsoft.com/office/drawing/2014/main" xmlns="" id="{B3AA35ED-DF99-6958-28FA-33A93BB97722}"/>
               </a:ext>
             </a:extLst>
           </p:cNvPr>
@@ -3241,7 +3242,7 @@
           <p:cNvPr id="4" name="Date Placeholder 3">
             <a:extLst>
               <a:ext uri="{FF2B5EF4-FFF2-40B4-BE49-F238E27FC236}">
-                <a16:creationId xmlns:a16="http://schemas.microsoft.com/office/drawing/2014/main" id="{55503DB0-5264-6061-D4B6-AE3D944FC839}"/>
+                <a16:creationId xmlns:a16="http://schemas.microsoft.com/office/drawing/2014/main" xmlns="" id="{55503DB0-5264-6061-D4B6-AE3D944FC839}"/>
               </a:ext>
             </a:extLst>
           </p:cNvPr>
@@ -3259,7 +3260,7 @@
           <a:p>
             <a:fld id="{1D8BD707-D9CF-40AE-B4C6-C98DA3205C09}" type="datetimeFigureOut">
               <a:rPr lang="en-US" smtClean="0"/>
-              <a:t>12/8/2024</a:t>
+              <a:t>1/17/2025</a:t>
             </a:fld>
             <a:endParaRPr lang="en-US"/>
           </a:p>
@@ -3270,7 +3271,7 @@
           <p:cNvPr id="5" name="Slide Number Placeholder 4">
             <a:extLst>
               <a:ext uri="{FF2B5EF4-FFF2-40B4-BE49-F238E27FC236}">
-                <a16:creationId xmlns:a16="http://schemas.microsoft.com/office/drawing/2014/main" id="{306C615E-9D94-7E15-4EC3-69D6111D00EE}"/>
+                <a16:creationId xmlns:a16="http://schemas.microsoft.com/office/drawing/2014/main" xmlns="" id="{306C615E-9D94-7E15-4EC3-69D6111D00EE}"/>
               </a:ext>
             </a:extLst>
           </p:cNvPr>
@@ -3380,7 +3381,7 @@
           <a:p>
             <a:fld id="{1D8BD707-D9CF-40AE-B4C6-C98DA3205C09}" type="datetimeFigureOut">
               <a:rPr lang="en-US"/>
-              <a:t>12/8/2024</a:t>
+              <a:t>1/17/2025</a:t>
             </a:fld>
             <a:endParaRPr lang="en-US"/>
           </a:p>
@@ -3453,7 +3454,7 @@
           <p:cNvPr id="25" name="Rectangle 24">
             <a:extLst>
               <a:ext uri="{FF2B5EF4-FFF2-40B4-BE49-F238E27FC236}">
-                <a16:creationId xmlns:a16="http://schemas.microsoft.com/office/drawing/2014/main" id="{669E0535-6FD9-4D8F-80CA-FF7A96DB665F}"/>
+                <a16:creationId xmlns:a16="http://schemas.microsoft.com/office/drawing/2014/main" xmlns="" id="{669E0535-6FD9-4D8F-80CA-FF7A96DB665F}"/>
               </a:ext>
             </a:extLst>
           </p:cNvPr>
@@ -3496,7 +3497,7 @@
           <a:lstStyle/>
           <a:p>
             <a:pPr algn="ctr"/>
-            <a:endParaRPr lang="en-KW" sz="2400"/>
+            <a:endParaRPr lang="x-none" sz="2400"/>
           </a:p>
         </p:txBody>
       </p:sp>
@@ -3505,7 +3506,7 @@
           <p:cNvPr id="26" name="Picture 25" descr="A black and red background with a bird&#10;&#10;Description automatically generated">
             <a:extLst>
               <a:ext uri="{FF2B5EF4-FFF2-40B4-BE49-F238E27FC236}">
-                <a16:creationId xmlns:a16="http://schemas.microsoft.com/office/drawing/2014/main" id="{7356EFA9-D406-4147-B1F7-82B217840839}"/>
+                <a16:creationId xmlns:a16="http://schemas.microsoft.com/office/drawing/2014/main" xmlns="" id="{7356EFA9-D406-4147-B1F7-82B217840839}"/>
               </a:ext>
             </a:extLst>
           </p:cNvPr>
@@ -3535,7 +3536,7 @@
           <p:cNvPr id="27" name="Google Shape;15;p13">
             <a:extLst>
               <a:ext uri="{FF2B5EF4-FFF2-40B4-BE49-F238E27FC236}">
-                <a16:creationId xmlns:a16="http://schemas.microsoft.com/office/drawing/2014/main" id="{F5F3B15A-58C1-48A3-AB6A-E8A3A8F0B1F0}"/>
+                <a16:creationId xmlns:a16="http://schemas.microsoft.com/office/drawing/2014/main" xmlns="" id="{F5F3B15A-58C1-48A3-AB6A-E8A3A8F0B1F0}"/>
               </a:ext>
             </a:extLst>
           </p:cNvPr>
@@ -3701,7 +3702,7 @@
           <p:cNvPr id="28" name="Google Shape;19;p14">
             <a:extLst>
               <a:ext uri="{FF2B5EF4-FFF2-40B4-BE49-F238E27FC236}">
-                <a16:creationId xmlns:a16="http://schemas.microsoft.com/office/drawing/2014/main" id="{A6353D6C-199F-4C21-9FC8-2D00FAAA26A6}"/>
+                <a16:creationId xmlns:a16="http://schemas.microsoft.com/office/drawing/2014/main" xmlns="" id="{A6353D6C-199F-4C21-9FC8-2D00FAAA26A6}"/>
               </a:ext>
             </a:extLst>
           </p:cNvPr>
@@ -3980,7 +3981,7 @@
           <p:cNvPr id="29" name="Google Shape;55;p1">
             <a:extLst>
               <a:ext uri="{FF2B5EF4-FFF2-40B4-BE49-F238E27FC236}">
-                <a16:creationId xmlns:a16="http://schemas.microsoft.com/office/drawing/2014/main" id="{4544F053-DAFF-4191-A4FE-EAC318BF6A0C}"/>
+                <a16:creationId xmlns:a16="http://schemas.microsoft.com/office/drawing/2014/main" xmlns="" id="{4544F053-DAFF-4191-A4FE-EAC318BF6A0C}"/>
               </a:ext>
             </a:extLst>
           </p:cNvPr>
@@ -4052,7 +4053,7 @@
           <p:cNvPr id="2" name="Title 1">
             <a:extLst>
               <a:ext uri="{FF2B5EF4-FFF2-40B4-BE49-F238E27FC236}">
-                <a16:creationId xmlns:a16="http://schemas.microsoft.com/office/drawing/2014/main" id="{7B6E2517-3805-41A0-9280-523D3C8CC82F}"/>
+                <a16:creationId xmlns:a16="http://schemas.microsoft.com/office/drawing/2014/main" xmlns="" id="{7B6E2517-3805-41A0-9280-523D3C8CC82F}"/>
               </a:ext>
             </a:extLst>
           </p:cNvPr>
@@ -4291,7 +4292,7 @@
           <a:p>
             <a:fld id="{1D8BD707-D9CF-40AE-B4C6-C98DA3205C09}" type="datetimeFigureOut">
               <a:rPr lang="en-US"/>
-              <a:t>12/8/2024</a:t>
+              <a:t>1/17/2025</a:t>
             </a:fld>
             <a:endParaRPr lang="en-US"/>
           </a:p>
@@ -4570,7 +4571,7 @@
                   <a:noFill/>
                 </a:ln>
                 <a:solidFill>
-                  <a:srgbClr val="00B050"/>
+                  <a:srgbClr val="0070C0"/>
                 </a:solidFill>
                 <a:effectLst/>
                 <a:uLnTx/>
@@ -4606,7 +4607,7 @@
                   <a:noFill/>
                 </a:ln>
                 <a:solidFill>
-                  <a:srgbClr val="00B050"/>
+                  <a:srgbClr val="0070C0"/>
                 </a:solidFill>
                 <a:effectLst/>
                 <a:uLnTx/>
@@ -4623,7 +4624,7 @@
                   <a:noFill/>
                 </a:ln>
                 <a:solidFill>
-                  <a:srgbClr val="00B050"/>
+                  <a:srgbClr val="0070C0"/>
                 </a:solidFill>
                 <a:effectLst/>
                 <a:uLnTx/>
@@ -4640,7 +4641,7 @@
                   <a:noFill/>
                 </a:ln>
                 <a:solidFill>
-                  <a:srgbClr val="00B050"/>
+                  <a:srgbClr val="0070C0"/>
                 </a:solidFill>
                 <a:effectLst/>
                 <a:uLnTx/>
@@ -4649,15 +4650,15 @@
                 <a:ea typeface="+mn-ea"/>
                 <a:cs typeface="Arial" pitchFamily="34" charset="0"/>
               </a:rPr>
-              <a:t> 20</a:t>
-            </a:r>
-            <a:r>
-              <a:rPr kumimoji="0" lang="en-US" sz="3600" b="1" i="0" u="none" strike="noStrike" kern="1200" cap="none" spc="0" normalizeH="0" baseline="0" noProof="0" dirty="0">
+              <a:t> </a:t>
+            </a:r>
+            <a:r>
+              <a:rPr kumimoji="0" lang="x-none" sz="3600" b="1" i="0" u="none" strike="noStrike" kern="1200" cap="none" spc="0" normalizeH="0" baseline="0" noProof="0">
                 <a:ln>
                   <a:noFill/>
                 </a:ln>
                 <a:solidFill>
-                  <a:srgbClr val="00B050"/>
+                  <a:srgbClr val="0070C0"/>
                 </a:solidFill>
                 <a:effectLst/>
                 <a:uLnTx/>
@@ -4666,8 +4667,39 @@
                 <a:ea typeface="+mn-ea"/>
                 <a:cs typeface="Arial" pitchFamily="34" charset="0"/>
               </a:rPr>
-              <a:t>2</a:t>
-            </a:r>
+              <a:t>20</a:t>
+            </a:r>
+            <a:r>
+              <a:rPr kumimoji="0" lang="en-US" sz="3600" b="1" i="0" u="none" strike="noStrike" kern="1200" cap="none" spc="0" normalizeH="0" baseline="0" noProof="0" dirty="0" smtClean="0">
+                <a:ln>
+                  <a:noFill/>
+                </a:ln>
+                <a:solidFill>
+                  <a:srgbClr val="0070C0"/>
+                </a:solidFill>
+                <a:effectLst/>
+                <a:uLnTx/>
+                <a:uFillTx/>
+                <a:latin typeface="Arial" pitchFamily="34" charset="0"/>
+                <a:ea typeface="+mn-ea"/>
+                <a:cs typeface="Arial" pitchFamily="34" charset="0"/>
+              </a:rPr>
+              <a:t>2 – Spring 2025</a:t>
+            </a:r>
+            <a:endParaRPr kumimoji="0" lang="en-US" sz="3600" b="1" i="0" u="none" strike="noStrike" kern="1200" cap="none" spc="0" normalizeH="0" baseline="0" noProof="0" dirty="0">
+              <a:ln>
+                <a:noFill/>
+              </a:ln>
+              <a:solidFill>
+                <a:srgbClr val="0070C0"/>
+              </a:solidFill>
+              <a:effectLst/>
+              <a:uLnTx/>
+              <a:uFillTx/>
+              <a:latin typeface="Arial" pitchFamily="34" charset="0"/>
+              <a:ea typeface="+mn-ea"/>
+              <a:cs typeface="Arial" pitchFamily="34" charset="0"/>
+            </a:endParaRPr>
           </a:p>
         </p:txBody>
       </p:sp>
@@ -4676,7 +4708,7 @@
           <p:cNvPr id="2" name="TextBox 1">
             <a:extLst>
               <a:ext uri="{FF2B5EF4-FFF2-40B4-BE49-F238E27FC236}">
-                <a16:creationId xmlns:a16="http://schemas.microsoft.com/office/drawing/2014/main" id="{07DEEC26-75A9-F4A2-6948-691F17B753B2}"/>
+                <a16:creationId xmlns:a16="http://schemas.microsoft.com/office/drawing/2014/main" xmlns="" id="{07DEEC26-75A9-F4A2-6948-691F17B753B2}"/>
               </a:ext>
             </a:extLst>
           </p:cNvPr>
@@ -4705,7 +4737,7 @@
             <a:r>
               <a:rPr lang="en-US" sz="4400" b="1" dirty="0">
                 <a:solidFill>
-                  <a:srgbClr val="0000FF"/>
+                  <a:srgbClr val="00B050"/>
                 </a:solidFill>
                 <a:latin typeface="Cambria" panose="02040503050406030204" pitchFamily="18" charset="0"/>
                 <a:ea typeface="Cambria" panose="02040503050406030204" pitchFamily="18" charset="0"/>
@@ -5768,14 +5800,14 @@
                 <a:gridCol w="3686175">
                   <a:extLst>
                     <a:ext uri="{9D8B030D-6E8A-4147-A177-3AD203B41FA5}">
-                      <a16:colId xmlns:a16="http://schemas.microsoft.com/office/drawing/2014/main" val="20000"/>
+                      <a16:colId xmlns:a16="http://schemas.microsoft.com/office/drawing/2014/main" xmlns="" val="20000"/>
                     </a:ext>
                   </a:extLst>
                 </a:gridCol>
                 <a:gridCol w="3686175">
                   <a:extLst>
                     <a:ext uri="{9D8B030D-6E8A-4147-A177-3AD203B41FA5}">
-                      <a16:colId xmlns:a16="http://schemas.microsoft.com/office/drawing/2014/main" val="20001"/>
+                      <a16:colId xmlns:a16="http://schemas.microsoft.com/office/drawing/2014/main" xmlns="" val="20001"/>
                     </a:ext>
                   </a:extLst>
                 </a:gridCol>
@@ -6054,7 +6086,7 @@
                 </a:tc>
                 <a:extLst>
                   <a:ext uri="{0D108BD9-81ED-4DB2-BD59-A6C34878D82A}">
-                    <a16:rowId xmlns:a16="http://schemas.microsoft.com/office/drawing/2014/main" val="10000"/>
+                    <a16:rowId xmlns:a16="http://schemas.microsoft.com/office/drawing/2014/main" xmlns="" val="10000"/>
                   </a:ext>
                 </a:extLst>
               </a:tr>
@@ -6332,7 +6364,7 @@
                 </a:tc>
                 <a:extLst>
                   <a:ext uri="{0D108BD9-81ED-4DB2-BD59-A6C34878D82A}">
-                    <a16:rowId xmlns:a16="http://schemas.microsoft.com/office/drawing/2014/main" val="10001"/>
+                    <a16:rowId xmlns:a16="http://schemas.microsoft.com/office/drawing/2014/main" xmlns="" val="10001"/>
                   </a:ext>
                 </a:extLst>
               </a:tr>
@@ -6359,7 +6391,7 @@
                         <a:tabLst/>
                       </a:pPr>
                       <a:r>
-                        <a:rPr kumimoji="0" lang="en-US" sz="2800" b="0" i="0" u="none" strike="noStrike" cap="none" normalizeH="0" baseline="0">
+                        <a:rPr kumimoji="0" lang="en-US" sz="2800" b="0" i="0" u="none" strike="noStrike" cap="none" normalizeH="0" baseline="0" dirty="0">
                           <a:ln>
                             <a:noFill/>
                           </a:ln>
@@ -6370,10 +6402,10 @@
                           <a:latin typeface="Cambria" pitchFamily="18" charset="0"/>
                           <a:cs typeface="Arial" pitchFamily="34" charset="0"/>
                         </a:rPr>
-                        <a:t>      I</a:t>
+                        <a:t>      </a:t>
                       </a:r>
                       <a:r>
-                        <a:rPr kumimoji="0" lang="en-US" sz="2800" b="0" i="0" u="none" strike="noStrike" cap="none" normalizeH="0" baseline="-25000">
+                        <a:rPr kumimoji="0" lang="en-US" sz="2800" b="0" i="0" u="none" strike="noStrike" cap="none" normalizeH="0" baseline="0" dirty="0" err="1">
                           <a:ln>
                             <a:noFill/>
                           </a:ln>
@@ -6384,10 +6416,10 @@
                           <a:latin typeface="Cambria" pitchFamily="18" charset="0"/>
                           <a:cs typeface="Arial" pitchFamily="34" charset="0"/>
                         </a:rPr>
-                        <a:t>m </a:t>
+                        <a:t>I</a:t>
                       </a:r>
                       <a:r>
-                        <a:rPr kumimoji="0" lang="en-US" sz="2800" b="0" i="0" u="none" strike="noStrike" cap="none" normalizeH="0" baseline="0">
+                        <a:rPr kumimoji="0" lang="en-US" sz="2800" b="0" i="0" u="none" strike="noStrike" cap="none" normalizeH="0" baseline="-25000" dirty="0" err="1">
                           <a:ln>
                             <a:noFill/>
                           </a:ln>
@@ -6398,10 +6430,66 @@
                           <a:latin typeface="Cambria" pitchFamily="18" charset="0"/>
                           <a:cs typeface="Arial" pitchFamily="34" charset="0"/>
                         </a:rPr>
-                        <a:t>Cos (wt+</a:t>
+                        <a:t>m</a:t>
                       </a:r>
                       <a:r>
-                        <a:rPr kumimoji="0" lang="el-GR" sz="2800" b="0" i="0" u="none" strike="noStrike" cap="none" normalizeH="0" baseline="0">
+                        <a:rPr kumimoji="0" lang="en-US" sz="2800" b="0" i="0" u="none" strike="noStrike" cap="none" normalizeH="0" baseline="-25000" dirty="0">
+                          <a:ln>
+                            <a:noFill/>
+                          </a:ln>
+                          <a:solidFill>
+                            <a:schemeClr val="tx1"/>
+                          </a:solidFill>
+                          <a:effectLst/>
+                          <a:latin typeface="Cambria" pitchFamily="18" charset="0"/>
+                          <a:cs typeface="Arial" pitchFamily="34" charset="0"/>
+                        </a:rPr>
+                        <a:t> </a:t>
+                      </a:r>
+                      <a:r>
+                        <a:rPr kumimoji="0" lang="en-US" sz="2800" b="0" i="0" u="none" strike="noStrike" cap="none" normalizeH="0" baseline="0" dirty="0">
+                          <a:ln>
+                            <a:noFill/>
+                          </a:ln>
+                          <a:solidFill>
+                            <a:schemeClr val="tx1"/>
+                          </a:solidFill>
+                          <a:effectLst/>
+                          <a:latin typeface="Cambria" pitchFamily="18" charset="0"/>
+                          <a:cs typeface="Arial" pitchFamily="34" charset="0"/>
+                        </a:rPr>
+                        <a:t>Cos (</a:t>
+                      </a:r>
+                      <a:r>
+                        <a:rPr kumimoji="0" lang="en-US" sz="2800" b="0" i="0" u="none" strike="noStrike" cap="none" normalizeH="0" baseline="0" dirty="0" err="1">
+                          <a:ln>
+                            <a:noFill/>
+                          </a:ln>
+                          <a:solidFill>
+                            <a:schemeClr val="tx1"/>
+                          </a:solidFill>
+                          <a:effectLst/>
+                          <a:latin typeface="Cambria" pitchFamily="18" charset="0"/>
+                          <a:cs typeface="Arial" pitchFamily="34" charset="0"/>
+                        </a:rPr>
+                        <a:t>wt</a:t>
+                      </a:r>
+                      <a:r>
+                        <a:rPr kumimoji="0" lang="en-US" sz="2800" b="0" i="0" u="none" strike="noStrike" cap="none" normalizeH="0" baseline="0" dirty="0">
+                          <a:ln>
+                            <a:noFill/>
+                          </a:ln>
+                          <a:solidFill>
+                            <a:schemeClr val="tx1"/>
+                          </a:solidFill>
+                          <a:effectLst/>
+                          <a:latin typeface="Cambria" pitchFamily="18" charset="0"/>
+                          <a:cs typeface="Arial" pitchFamily="34" charset="0"/>
+                        </a:rPr>
+                        <a:t>+</a:t>
+                      </a:r>
+                      <a:r>
+                        <a:rPr kumimoji="0" lang="el-GR" sz="2800" b="0" i="0" u="none" strike="noStrike" cap="none" normalizeH="0" baseline="0" dirty="0">
                           <a:ln>
                             <a:noFill/>
                           </a:ln>
@@ -6415,7 +6503,7 @@
                         <a:t>φ</a:t>
                       </a:r>
                       <a:r>
-                        <a:rPr kumimoji="0" lang="en-US" sz="2800" b="0" i="0" u="none" strike="noStrike" cap="none" normalizeH="0" baseline="0">
+                        <a:rPr kumimoji="0" lang="en-US" sz="2800" b="0" i="0" u="none" strike="noStrike" cap="none" normalizeH="0" baseline="0" dirty="0">
                           <a:ln>
                             <a:noFill/>
                           </a:ln>
@@ -6554,7 +6642,7 @@
                 </a:tc>
                 <a:extLst>
                   <a:ext uri="{0D108BD9-81ED-4DB2-BD59-A6C34878D82A}">
-                    <a16:rowId xmlns:a16="http://schemas.microsoft.com/office/drawing/2014/main" val="10002"/>
+                    <a16:rowId xmlns:a16="http://schemas.microsoft.com/office/drawing/2014/main" xmlns="" val="10002"/>
                   </a:ext>
                 </a:extLst>
               </a:tr>
@@ -6776,7 +6864,7 @@
                 </a:tc>
                 <a:extLst>
                   <a:ext uri="{0D108BD9-81ED-4DB2-BD59-A6C34878D82A}">
-                    <a16:rowId xmlns:a16="http://schemas.microsoft.com/office/drawing/2014/main" val="10003"/>
+                    <a16:rowId xmlns:a16="http://schemas.microsoft.com/office/drawing/2014/main" xmlns="" val="10003"/>
                   </a:ext>
                 </a:extLst>
               </a:tr>
@@ -8191,7 +8279,7 @@
             <a:r>
               <a:rPr lang="en-US" altLang="en-US" sz="2800" b="1" dirty="0">
                 <a:solidFill>
-                  <a:srgbClr val="0000FF"/>
+                  <a:srgbClr val="00B050"/>
                 </a:solidFill>
                 <a:latin typeface="Cambria" panose="02040503050406030204" pitchFamily="18" charset="0"/>
               </a:rPr>
@@ -8254,7 +8342,7 @@
             <a:r>
               <a:rPr lang="en-US" sz="4000" dirty="0">
                 <a:solidFill>
-                  <a:srgbClr val="0000FF"/>
+                  <a:srgbClr val="00B050"/>
                 </a:solidFill>
                 <a:latin typeface="Cambria" panose="02040503050406030204" pitchFamily="18" charset="0"/>
               </a:rPr>
@@ -8704,7 +8792,7 @@
                             <a:solidFill>
                               <a:srgbClr val="0000FF"/>
                             </a:solidFill>
-                            <a:latin typeface="Cambria Math" panose="02040503050406030204" pitchFamily="18" charset="0"/>
+                            <a:latin typeface="Cambria Math"/>
                           </a:rPr>
                         </m:ctrlPr>
                       </m:dPr>
@@ -8979,7 +9067,7 @@
             <a:r>
               <a:rPr lang="en-US" sz="4000" b="1" dirty="0">
                 <a:solidFill>
-                  <a:srgbClr val="0000CC"/>
+                  <a:srgbClr val="00B050"/>
                 </a:solidFill>
                 <a:latin typeface="Cambria" panose="02040503050406030204" pitchFamily="18" charset="0"/>
               </a:rPr>
@@ -9027,7 +9115,7 @@
               <p:cNvPr id="36" name="Rectangle 35">
                 <a:extLst>
                   <a:ext uri="{FF2B5EF4-FFF2-40B4-BE49-F238E27FC236}">
-                    <a16:creationId xmlns:a16="http://schemas.microsoft.com/office/drawing/2014/main" id="{DD416111-894B-2548-94ED-30497B6745DE}"/>
+                    <a16:creationId xmlns:a16="http://schemas.microsoft.com/office/drawing/2014/main" xmlns="" id="{DD416111-894B-2548-94ED-30497B6745DE}"/>
                   </a:ext>
                 </a:extLst>
               </p:cNvPr>
@@ -9063,7 +9151,7 @@
                       <m:sSubPr>
                         <m:ctrlPr>
                           <a:rPr lang="en-US" sz="2000" b="1" i="1" smtClean="0">
-                            <a:latin typeface="Cambria Math" panose="02040503050406030204" pitchFamily="18" charset="0"/>
+                            <a:latin typeface="Cambria Math"/>
                           </a:rPr>
                         </m:ctrlPr>
                       </m:sSubPr>
@@ -9088,7 +9176,7 @@
                       <m:dPr>
                         <m:ctrlPr>
                           <a:rPr lang="en-CA" sz="2000" b="1" i="1" smtClean="0">
-                            <a:latin typeface="Cambria Math" panose="02040503050406030204" pitchFamily="18" charset="0"/>
+                            <a:latin typeface="Cambria Math"/>
                           </a:rPr>
                         </m:ctrlPr>
                       </m:dPr>
@@ -9112,7 +9200,7 @@
                         <m:degHide m:val="on"/>
                         <m:ctrlPr>
                           <a:rPr lang="en-CA" sz="2000" b="1" i="1" smtClean="0">
-                            <a:latin typeface="Cambria Math" panose="02040503050406030204" pitchFamily="18" charset="0"/>
+                            <a:latin typeface="Cambria Math"/>
                           </a:rPr>
                         </m:ctrlPr>
                       </m:radPr>
@@ -9172,7 +9260,7 @@
                       <m:sSupPr>
                         <m:ctrlPr>
                           <a:rPr lang="en-CA" sz="2000" b="1" i="1" smtClean="0">
-                            <a:latin typeface="Cambria Math" panose="02040503050406030204" pitchFamily="18" charset="0"/>
+                            <a:latin typeface="Cambria Math"/>
                           </a:rPr>
                         </m:ctrlPr>
                       </m:sSupPr>
@@ -9271,7 +9359,7 @@
               <p:cNvPr id="2" name="TextBox 1">
                 <a:extLst>
                   <a:ext uri="{FF2B5EF4-FFF2-40B4-BE49-F238E27FC236}">
-                    <a16:creationId xmlns:a16="http://schemas.microsoft.com/office/drawing/2014/main" id="{B04335DE-9665-0042-B09D-04292095B2B5}"/>
+                    <a16:creationId xmlns:a16="http://schemas.microsoft.com/office/drawing/2014/main" xmlns="" id="{B04335DE-9665-0042-B09D-04292095B2B5}"/>
                   </a:ext>
                 </a:extLst>
               </p:cNvPr>
@@ -9311,7 +9399,7 @@
                         <m:dPr>
                           <m:ctrlPr>
                             <a:rPr lang="en-CA" sz="2200" b="1" i="1" smtClean="0">
-                              <a:latin typeface="Cambria Math" panose="02040503050406030204" pitchFamily="18" charset="0"/>
+                              <a:latin typeface="Cambria Math"/>
                             </a:rPr>
                           </m:ctrlPr>
                         </m:dPr>
@@ -9334,7 +9422,7 @@
                         <m:fPr>
                           <m:ctrlPr>
                             <a:rPr lang="en-CA" sz="2200" b="1" i="1" smtClean="0">
-                              <a:latin typeface="Cambria Math" panose="02040503050406030204" pitchFamily="18" charset="0"/>
+                              <a:latin typeface="Cambria Math"/>
                             </a:rPr>
                           </m:ctrlPr>
                         </m:fPr>
@@ -9343,7 +9431,7 @@
                             <m:sSubPr>
                               <m:ctrlPr>
                                 <a:rPr lang="en-CA" sz="2200" b="1" i="1" smtClean="0">
-                                  <a:latin typeface="Cambria Math" panose="02040503050406030204" pitchFamily="18" charset="0"/>
+                                  <a:latin typeface="Cambria Math"/>
                                 </a:rPr>
                               </m:ctrlPr>
                             </m:sSubPr>
@@ -9388,7 +9476,7 @@
                             <m:sSubPr>
                               <m:ctrlPr>
                                 <a:rPr lang="en-CA" sz="2200" b="1" i="1" smtClean="0">
-                                  <a:latin typeface="Cambria Math" panose="02040503050406030204" pitchFamily="18" charset="0"/>
+                                  <a:latin typeface="Cambria Math"/>
                                 </a:rPr>
                               </m:ctrlPr>
                             </m:sSubPr>
@@ -9439,7 +9527,7 @@
                         <m:fPr>
                           <m:ctrlPr>
                             <a:rPr lang="en-CA" sz="2200" b="1" i="1" smtClean="0">
-                              <a:latin typeface="Cambria Math" panose="02040503050406030204" pitchFamily="18" charset="0"/>
+                              <a:latin typeface="Cambria Math"/>
                             </a:rPr>
                           </m:ctrlPr>
                         </m:fPr>
@@ -9448,7 +9536,7 @@
                             <m:sSupPr>
                               <m:ctrlPr>
                                 <a:rPr lang="en-CA" sz="2200" b="1" i="1" smtClean="0">
-                                  <a:latin typeface="Cambria Math" panose="02040503050406030204" pitchFamily="18" charset="0"/>
+                                  <a:latin typeface="Cambria Math"/>
                                 </a:rPr>
                               </m:ctrlPr>
                             </m:sSupPr>
@@ -9517,7 +9605,7 @@
                             <m:sSupPr>
                               <m:ctrlPr>
                                 <a:rPr lang="en-CA" sz="2200" b="1" i="1">
-                                  <a:latin typeface="Cambria Math" panose="02040503050406030204" pitchFamily="18" charset="0"/>
+                                  <a:latin typeface="Cambria Math"/>
                                 </a:rPr>
                               </m:ctrlPr>
                             </m:sSupPr>
@@ -9654,7 +9742,7 @@
               <p:cNvPr id="5" name="Rectangle 4">
                 <a:extLst>
                   <a:ext uri="{FF2B5EF4-FFF2-40B4-BE49-F238E27FC236}">
-                    <a16:creationId xmlns:a16="http://schemas.microsoft.com/office/drawing/2014/main" id="{83D36993-6933-3B48-9D05-CFC2284C821C}"/>
+                    <a16:creationId xmlns:a16="http://schemas.microsoft.com/office/drawing/2014/main" xmlns="" id="{83D36993-6933-3B48-9D05-CFC2284C821C}"/>
                   </a:ext>
                 </a:extLst>
               </p:cNvPr>
@@ -9685,7 +9773,7 @@
                             <a:solidFill>
                               <a:srgbClr val="C00000"/>
                             </a:solidFill>
-                            <a:latin typeface="Cambria Math" panose="02040503050406030204" pitchFamily="18" charset="0"/>
+                            <a:latin typeface="Cambria Math"/>
                           </a:rPr>
                         </m:ctrlPr>
                       </m:sSubPr>
@@ -9737,7 +9825,7 @@
                             <a:solidFill>
                               <a:srgbClr val="C00000"/>
                             </a:solidFill>
-                            <a:latin typeface="Cambria Math" panose="02040503050406030204" pitchFamily="18" charset="0"/>
+                            <a:latin typeface="Cambria Math"/>
                           </a:rPr>
                         </m:ctrlPr>
                       </m:dPr>
@@ -9832,7 +9920,7 @@
                             <a:solidFill>
                               <a:srgbClr val="C00000"/>
                             </a:solidFill>
-                            <a:latin typeface="Cambria Math" panose="02040503050406030204" pitchFamily="18" charset="0"/>
+                            <a:latin typeface="Cambria Math"/>
                           </a:rPr>
                         </m:ctrlPr>
                       </m:sSupPr>
@@ -9940,7 +10028,7 @@
               <p:cNvPr id="4" name="Rectangle 3">
                 <a:extLst>
                   <a:ext uri="{FF2B5EF4-FFF2-40B4-BE49-F238E27FC236}">
-                    <a16:creationId xmlns:a16="http://schemas.microsoft.com/office/drawing/2014/main" id="{A6ABFA42-3E75-1049-8289-6D1E094EF7DA}"/>
+                    <a16:creationId xmlns:a16="http://schemas.microsoft.com/office/drawing/2014/main" xmlns="" id="{A6ABFA42-3E75-1049-8289-6D1E094EF7DA}"/>
                   </a:ext>
                 </a:extLst>
               </p:cNvPr>
@@ -9980,7 +10068,7 @@
                             <a:solidFill>
                               <a:srgbClr val="C00000"/>
                             </a:solidFill>
-                            <a:latin typeface="Cambria Math" panose="02040503050406030204" pitchFamily="18" charset="0"/>
+                            <a:latin typeface="Cambria Math"/>
                           </a:rPr>
                         </m:ctrlPr>
                       </m:dPr>
@@ -10021,7 +10109,7 @@
                             <a:solidFill>
                               <a:srgbClr val="C00000"/>
                             </a:solidFill>
-                            <a:latin typeface="Cambria Math" panose="02040503050406030204" pitchFamily="18" charset="0"/>
+                            <a:latin typeface="Cambria Math"/>
                           </a:rPr>
                         </m:ctrlPr>
                       </m:fPr>
@@ -10033,7 +10121,7 @@
                                 <a:solidFill>
                                   <a:srgbClr val="C00000"/>
                                 </a:solidFill>
-                                <a:latin typeface="Cambria Math" panose="02040503050406030204" pitchFamily="18" charset="0"/>
+                                <a:latin typeface="Cambria Math"/>
                               </a:rPr>
                             </m:ctrlPr>
                           </m:sSupPr>
@@ -10177,7 +10265,7 @@
                                 <a:solidFill>
                                   <a:srgbClr val="C00000"/>
                                 </a:solidFill>
-                                <a:latin typeface="Cambria Math" panose="02040503050406030204" pitchFamily="18" charset="0"/>
+                                <a:latin typeface="Cambria Math"/>
                               </a:rPr>
                             </m:ctrlPr>
                           </m:sSupPr>
@@ -10348,7 +10436,7 @@
                             <a:solidFill>
                               <a:srgbClr val="C00000"/>
                             </a:solidFill>
-                            <a:latin typeface="Cambria Math" panose="02040503050406030204" pitchFamily="18" charset="0"/>
+                            <a:latin typeface="Cambria Math"/>
                           </a:rPr>
                         </m:ctrlPr>
                       </m:fPr>
@@ -10361,7 +10449,7 @@
                                 <a:solidFill>
                                   <a:srgbClr val="C00000"/>
                                 </a:solidFill>
-                                <a:latin typeface="Cambria Math" panose="02040503050406030204" pitchFamily="18" charset="0"/>
+                                <a:latin typeface="Cambria Math"/>
                               </a:rPr>
                             </m:ctrlPr>
                           </m:radPr>
@@ -10532,7 +10620,7 @@
             <a:r>
               <a:rPr lang="en-US" sz="2800" b="1" dirty="0">
                 <a:solidFill>
-                  <a:srgbClr val="0000CC"/>
+                  <a:srgbClr val="00B050"/>
                 </a:solidFill>
                 <a:latin typeface="Cambria" panose="02040503050406030204" pitchFamily="18" charset="0"/>
               </a:rPr>
@@ -10579,7 +10667,7 @@
               <p:cNvPr id="36" name="Rectangle 35">
                 <a:extLst>
                   <a:ext uri="{FF2B5EF4-FFF2-40B4-BE49-F238E27FC236}">
-                    <a16:creationId xmlns:a16="http://schemas.microsoft.com/office/drawing/2014/main" id="{DD416111-894B-2548-94ED-30497B6745DE}"/>
+                    <a16:creationId xmlns:a16="http://schemas.microsoft.com/office/drawing/2014/main" xmlns="" id="{DD416111-894B-2548-94ED-30497B6745DE}"/>
                   </a:ext>
                 </a:extLst>
               </p:cNvPr>
@@ -10614,7 +10702,7 @@
                       <m:sSubPr>
                         <m:ctrlPr>
                           <a:rPr lang="en-US" sz="2000" b="1" i="1" smtClean="0">
-                            <a:latin typeface="Cambria Math" panose="02040503050406030204" pitchFamily="18" charset="0"/>
+                            <a:latin typeface="Cambria Math"/>
                           </a:rPr>
                         </m:ctrlPr>
                       </m:sSubPr>
@@ -10639,7 +10727,7 @@
                       <m:dPr>
                         <m:ctrlPr>
                           <a:rPr lang="en-CA" sz="2000" b="1" i="1" smtClean="0">
-                            <a:latin typeface="Cambria Math" panose="02040503050406030204" pitchFamily="18" charset="0"/>
+                            <a:latin typeface="Cambria Math"/>
                           </a:rPr>
                         </m:ctrlPr>
                       </m:dPr>
@@ -10710,7 +10798,7 @@
                       <m:sSupPr>
                         <m:ctrlPr>
                           <a:rPr lang="en-CA" sz="2000" b="1" i="1" smtClean="0">
-                            <a:latin typeface="Cambria Math" panose="02040503050406030204" pitchFamily="18" charset="0"/>
+                            <a:latin typeface="Cambria Math"/>
                           </a:rPr>
                         </m:ctrlPr>
                       </m:sSupPr>
@@ -10807,7 +10895,7 @@
               <p:cNvPr id="2" name="TextBox 1">
                 <a:extLst>
                   <a:ext uri="{FF2B5EF4-FFF2-40B4-BE49-F238E27FC236}">
-                    <a16:creationId xmlns:a16="http://schemas.microsoft.com/office/drawing/2014/main" id="{B04335DE-9665-0042-B09D-04292095B2B5}"/>
+                    <a16:creationId xmlns:a16="http://schemas.microsoft.com/office/drawing/2014/main" xmlns="" id="{B04335DE-9665-0042-B09D-04292095B2B5}"/>
                   </a:ext>
                 </a:extLst>
               </p:cNvPr>
@@ -10847,7 +10935,7 @@
                         <m:dPr>
                           <m:ctrlPr>
                             <a:rPr lang="en-CA" sz="2200" b="1" i="1" smtClean="0">
-                              <a:latin typeface="Cambria Math" panose="02040503050406030204" pitchFamily="18" charset="0"/>
+                              <a:latin typeface="Cambria Math"/>
                             </a:rPr>
                           </m:ctrlPr>
                         </m:dPr>
@@ -10870,7 +10958,7 @@
                         <m:fPr>
                           <m:ctrlPr>
                             <a:rPr lang="en-CA" sz="2200" b="1" i="1" smtClean="0">
-                              <a:latin typeface="Cambria Math" panose="02040503050406030204" pitchFamily="18" charset="0"/>
+                              <a:latin typeface="Cambria Math"/>
                             </a:rPr>
                           </m:ctrlPr>
                         </m:fPr>
@@ -10879,7 +10967,7 @@
                             <m:sSubPr>
                               <m:ctrlPr>
                                 <a:rPr lang="en-CA" sz="2200" b="1" i="1" smtClean="0">
-                                  <a:latin typeface="Cambria Math" panose="02040503050406030204" pitchFamily="18" charset="0"/>
+                                  <a:latin typeface="Cambria Math"/>
                                 </a:rPr>
                               </m:ctrlPr>
                             </m:sSubPr>
@@ -10924,7 +11012,7 @@
                             <m:sSubPr>
                               <m:ctrlPr>
                                 <a:rPr lang="en-CA" sz="2200" b="1" i="1" smtClean="0">
-                                  <a:latin typeface="Cambria Math" panose="02040503050406030204" pitchFamily="18" charset="0"/>
+                                  <a:latin typeface="Cambria Math"/>
                                 </a:rPr>
                               </m:ctrlPr>
                             </m:sSubPr>
@@ -10975,7 +11063,7 @@
                         <m:fPr>
                           <m:ctrlPr>
                             <a:rPr lang="en-CA" sz="2200" b="1" i="1" smtClean="0">
-                              <a:latin typeface="Cambria Math" panose="02040503050406030204" pitchFamily="18" charset="0"/>
+                              <a:latin typeface="Cambria Math"/>
                             </a:rPr>
                           </m:ctrlPr>
                         </m:fPr>
@@ -11010,7 +11098,7 @@
                             <m:sSupPr>
                               <m:ctrlPr>
                                 <a:rPr lang="en-CA" sz="2200" b="1" i="1">
-                                  <a:latin typeface="Cambria Math" panose="02040503050406030204" pitchFamily="18" charset="0"/>
+                                  <a:latin typeface="Cambria Math"/>
                                 </a:rPr>
                               </m:ctrlPr>
                             </m:sSupPr>
@@ -11144,7 +11232,7 @@
               <p:cNvPr id="5" name="Rectangle 4">
                 <a:extLst>
                   <a:ext uri="{FF2B5EF4-FFF2-40B4-BE49-F238E27FC236}">
-                    <a16:creationId xmlns:a16="http://schemas.microsoft.com/office/drawing/2014/main" id="{83D36993-6933-3B48-9D05-CFC2284C821C}"/>
+                    <a16:creationId xmlns:a16="http://schemas.microsoft.com/office/drawing/2014/main" xmlns="" id="{83D36993-6933-3B48-9D05-CFC2284C821C}"/>
                   </a:ext>
                 </a:extLst>
               </p:cNvPr>
@@ -11175,7 +11263,7 @@
                             <a:solidFill>
                               <a:srgbClr val="C00000"/>
                             </a:solidFill>
-                            <a:latin typeface="Cambria Math" panose="02040503050406030204" pitchFamily="18" charset="0"/>
+                            <a:latin typeface="Cambria Math"/>
                           </a:rPr>
                         </m:ctrlPr>
                       </m:sSubPr>
@@ -11227,7 +11315,7 @@
                             <a:solidFill>
                               <a:srgbClr val="C00000"/>
                             </a:solidFill>
-                            <a:latin typeface="Cambria Math" panose="02040503050406030204" pitchFamily="18" charset="0"/>
+                            <a:latin typeface="Cambria Math"/>
                           </a:rPr>
                         </m:ctrlPr>
                       </m:dPr>
@@ -11349,7 +11437,7 @@
                             <a:solidFill>
                               <a:srgbClr val="C00000"/>
                             </a:solidFill>
-                            <a:latin typeface="Cambria Math" panose="02040503050406030204" pitchFamily="18" charset="0"/>
+                            <a:latin typeface="Cambria Math"/>
                           </a:rPr>
                         </m:ctrlPr>
                       </m:sSupPr>
@@ -11457,7 +11545,7 @@
               <p:cNvPr id="7" name="TextBox 6">
                 <a:extLst>
                   <a:ext uri="{FF2B5EF4-FFF2-40B4-BE49-F238E27FC236}">
-                    <a16:creationId xmlns:a16="http://schemas.microsoft.com/office/drawing/2014/main" id="{2AD295D3-F878-404A-8AAE-3EC72EF92F88}"/>
+                    <a16:creationId xmlns:a16="http://schemas.microsoft.com/office/drawing/2014/main" xmlns="" id="{2AD295D3-F878-404A-8AAE-3EC72EF92F88}"/>
                   </a:ext>
                 </a:extLst>
               </p:cNvPr>
@@ -11503,7 +11591,7 @@
                               <a:solidFill>
                                 <a:srgbClr val="C00000"/>
                               </a:solidFill>
-                              <a:latin typeface="Cambria Math" panose="02040503050406030204" pitchFamily="18" charset="0"/>
+                              <a:latin typeface="Cambria Math"/>
                             </a:rPr>
                           </m:ctrlPr>
                         </m:dPr>
@@ -11544,7 +11632,7 @@
                               <a:solidFill>
                                 <a:srgbClr val="C00000"/>
                               </a:solidFill>
-                              <a:latin typeface="Cambria Math" panose="02040503050406030204" pitchFamily="18" charset="0"/>
+                              <a:latin typeface="Cambria Math"/>
                             </a:rPr>
                           </m:ctrlPr>
                         </m:fPr>
@@ -11612,7 +11700,7 @@
                                   <a:solidFill>
                                     <a:srgbClr val="C00000"/>
                                   </a:solidFill>
-                                  <a:latin typeface="Cambria Math" panose="02040503050406030204" pitchFamily="18" charset="0"/>
+                                  <a:latin typeface="Cambria Math"/>
                                 </a:rPr>
                               </m:ctrlPr>
                             </m:sSupPr>
@@ -11933,7 +12021,7 @@
             <a:r>
               <a:rPr lang="en-US" sz="2800" b="1" dirty="0">
                 <a:solidFill>
-                  <a:srgbClr val="0000CC"/>
+                  <a:srgbClr val="00B050"/>
                 </a:solidFill>
                 <a:latin typeface="Cambria" panose="02040503050406030204" pitchFamily="18" charset="0"/>
               </a:rPr>
@@ -13347,7 +13435,7 @@
                         <m:sSubPr>
                           <m:ctrlPr>
                             <a:rPr lang="en-US" sz="2200" b="1" i="1" smtClean="0">
-                              <a:latin typeface="Cambria Math" panose="02040503050406030204" pitchFamily="18" charset="0"/>
+                              <a:latin typeface="Cambria Math"/>
                             </a:rPr>
                           </m:ctrlPr>
                         </m:sSubPr>
@@ -13384,7 +13472,7 @@
                         <m:dPr>
                           <m:ctrlPr>
                             <a:rPr lang="en-US" sz="2200" b="1" i="1" smtClean="0">
-                              <a:latin typeface="Cambria Math" panose="02040503050406030204" pitchFamily="18" charset="0"/>
+                              <a:latin typeface="Cambria Math"/>
                             </a:rPr>
                           </m:ctrlPr>
                         </m:dPr>
@@ -13413,7 +13501,7 @@
                         <m:dPr>
                           <m:ctrlPr>
                             <a:rPr lang="en-US" sz="2200" b="1" i="1" smtClean="0">
-                              <a:latin typeface="Cambria Math" panose="02040503050406030204" pitchFamily="18" charset="0"/>
+                              <a:latin typeface="Cambria Math"/>
                             </a:rPr>
                           </m:ctrlPr>
                         </m:dPr>
@@ -13436,7 +13524,7 @@
                         <m:sSubPr>
                           <m:ctrlPr>
                             <a:rPr lang="en-US" sz="2200" b="1" i="1" smtClean="0">
-                              <a:latin typeface="Cambria Math" panose="02040503050406030204" pitchFamily="18" charset="0"/>
+                              <a:latin typeface="Cambria Math"/>
                             </a:rPr>
                           </m:ctrlPr>
                         </m:sSubPr>
@@ -13559,7 +13647,7 @@
                         <m:sSubPr>
                           <m:ctrlPr>
                             <a:rPr lang="en-US" sz="2200" b="1" i="1" smtClean="0">
-                              <a:latin typeface="Cambria Math" panose="02040503050406030204" pitchFamily="18" charset="0"/>
+                              <a:latin typeface="Cambria Math"/>
                             </a:rPr>
                           </m:ctrlPr>
                         </m:sSubPr>
@@ -13596,7 +13684,7 @@
                         <m:dPr>
                           <m:ctrlPr>
                             <a:rPr lang="en-US" sz="2200" b="1" i="1" smtClean="0">
-                              <a:latin typeface="Cambria Math" panose="02040503050406030204" pitchFamily="18" charset="0"/>
+                              <a:latin typeface="Cambria Math"/>
                             </a:rPr>
                           </m:ctrlPr>
                         </m:dPr>
@@ -13619,7 +13707,7 @@
                         <m:fPr>
                           <m:ctrlPr>
                             <a:rPr lang="en-US" sz="2200" b="1" i="1" smtClean="0">
-                              <a:latin typeface="Cambria Math" panose="02040503050406030204" pitchFamily="18" charset="0"/>
+                              <a:latin typeface="Cambria Math"/>
                             </a:rPr>
                           </m:ctrlPr>
                         </m:fPr>
@@ -13648,7 +13736,7 @@
                             <m:sSupPr>
                               <m:ctrlPr>
                                 <a:rPr lang="en-US" sz="2200" b="1" i="1" smtClean="0">
-                                  <a:latin typeface="Cambria Math" panose="02040503050406030204" pitchFamily="18" charset="0"/>
+                                  <a:latin typeface="Cambria Math"/>
                                 </a:rPr>
                               </m:ctrlPr>
                             </m:sSupPr>
@@ -13679,7 +13767,7 @@
                             <m:dPr>
                               <m:ctrlPr>
                                 <a:rPr lang="en-US" sz="2200" b="1" i="1" smtClean="0">
-                                  <a:latin typeface="Cambria Math" panose="02040503050406030204" pitchFamily="18" charset="0"/>
+                                  <a:latin typeface="Cambria Math"/>
                                 </a:rPr>
                               </m:ctrlPr>
                             </m:dPr>
@@ -13906,7 +13994,7 @@
                         <m:sSupPr>
                           <m:ctrlPr>
                             <a:rPr lang="en-US" b="1" i="1" dirty="0" smtClean="0">
-                              <a:latin typeface="Cambria Math" panose="02040503050406030204" pitchFamily="18" charset="0"/>
+                              <a:latin typeface="Cambria Math"/>
                             </a:rPr>
                           </m:ctrlPr>
                         </m:sSupPr>
@@ -14128,6 +14216,2398 @@
           <a:chExt cx="0" cy="0"/>
         </a:xfrm>
       </p:grpSpPr>
+      <p:sp>
+        <p:nvSpPr>
+          <p:cNvPr id="3" name="TextBox 2"/>
+          <p:cNvSpPr txBox="1"/>
+          <p:nvPr/>
+        </p:nvSpPr>
+        <p:spPr>
+          <a:xfrm>
+            <a:off x="530942" y="228412"/>
+            <a:ext cx="2015167" cy="523220"/>
+          </a:xfrm>
+          <a:prstGeom prst="rect">
+            <a:avLst/>
+          </a:prstGeom>
+          <a:noFill/>
+        </p:spPr>
+        <p:txBody>
+          <a:bodyPr wrap="none" rtlCol="0">
+            <a:spAutoFit/>
+          </a:bodyPr>
+          <a:lstStyle/>
+          <a:p>
+            <a:r>
+              <a:rPr lang="en-US" sz="2800" b="1" dirty="0">
+                <a:solidFill>
+                  <a:srgbClr val="00B050"/>
+                </a:solidFill>
+                <a:latin typeface="Cambria" panose="02040503050406030204" pitchFamily="18" charset="0"/>
+              </a:rPr>
+              <a:t>Example -5</a:t>
+            </a:r>
+          </a:p>
+        </p:txBody>
+      </p:sp>
+      <p:grpSp>
+        <p:nvGrpSpPr>
+          <p:cNvPr id="2" name="Group 1"/>
+          <p:cNvGrpSpPr/>
+          <p:nvPr/>
+        </p:nvGrpSpPr>
+        <p:grpSpPr>
+          <a:xfrm>
+            <a:off x="7038875" y="807691"/>
+            <a:ext cx="4901186" cy="1938814"/>
+            <a:chOff x="5375213" y="751632"/>
+            <a:chExt cx="6442102" cy="2671909"/>
+          </a:xfrm>
+        </p:grpSpPr>
+        <p:sp>
+          <p:nvSpPr>
+            <p:cNvPr id="4" name="Oval 3"/>
+            <p:cNvSpPr/>
+            <p:nvPr/>
+          </p:nvSpPr>
+          <p:spPr>
+            <a:xfrm>
+              <a:off x="6404776" y="2021491"/>
+              <a:ext cx="871538" cy="800100"/>
+            </a:xfrm>
+            <a:prstGeom prst="ellipse">
+              <a:avLst/>
+            </a:prstGeom>
+            <a:noFill/>
+            <a:ln w="38100">
+              <a:solidFill>
+                <a:schemeClr val="tx1"/>
+              </a:solidFill>
+            </a:ln>
+          </p:spPr>
+          <p:style>
+            <a:lnRef idx="2">
+              <a:schemeClr val="accent1">
+                <a:shade val="50000"/>
+              </a:schemeClr>
+            </a:lnRef>
+            <a:fillRef idx="1">
+              <a:schemeClr val="accent1"/>
+            </a:fillRef>
+            <a:effectRef idx="0">
+              <a:schemeClr val="accent1"/>
+            </a:effectRef>
+            <a:fontRef idx="minor">
+              <a:schemeClr val="lt1"/>
+            </a:fontRef>
+          </p:style>
+          <p:txBody>
+            <a:bodyPr rtlCol="0" anchor="ctr"/>
+            <a:lstStyle/>
+            <a:p>
+              <a:pPr algn="ctr"/>
+              <a:endParaRPr lang="en-US"/>
+            </a:p>
+          </p:txBody>
+        </p:sp>
+        <p:cxnSp>
+          <p:nvCxnSpPr>
+            <p:cNvPr id="6" name="Straight Connector 5"/>
+            <p:cNvCxnSpPr/>
+            <p:nvPr/>
+          </p:nvCxnSpPr>
+          <p:spPr>
+            <a:xfrm flipH="1" flipV="1">
+              <a:off x="6779573" y="1367321"/>
+              <a:ext cx="576246" cy="1"/>
+            </a:xfrm>
+            <a:prstGeom prst="line">
+              <a:avLst/>
+            </a:prstGeom>
+            <a:ln w="38100">
+              <a:solidFill>
+                <a:schemeClr val="tx1"/>
+              </a:solidFill>
+              <a:tailEnd type="none"/>
+            </a:ln>
+          </p:spPr>
+          <p:style>
+            <a:lnRef idx="1">
+              <a:schemeClr val="accent1"/>
+            </a:lnRef>
+            <a:fillRef idx="0">
+              <a:schemeClr val="accent1"/>
+            </a:fillRef>
+            <a:effectRef idx="0">
+              <a:schemeClr val="accent1"/>
+            </a:effectRef>
+            <a:fontRef idx="minor">
+              <a:schemeClr val="tx1"/>
+            </a:fontRef>
+          </p:style>
+        </p:cxnSp>
+        <p:cxnSp>
+          <p:nvCxnSpPr>
+            <p:cNvPr id="7" name="Straight Connector 6"/>
+            <p:cNvCxnSpPr>
+              <a:endCxn id="18" idx="0"/>
+            </p:cNvCxnSpPr>
+            <p:nvPr/>
+          </p:nvCxnSpPr>
+          <p:spPr>
+            <a:xfrm flipH="1" flipV="1">
+              <a:off x="9379062" y="1414091"/>
+              <a:ext cx="1755970" cy="0"/>
+            </a:xfrm>
+            <a:prstGeom prst="line">
+              <a:avLst/>
+            </a:prstGeom>
+            <a:ln w="38100">
+              <a:solidFill>
+                <a:schemeClr val="tx1"/>
+              </a:solidFill>
+            </a:ln>
+          </p:spPr>
+          <p:style>
+            <a:lnRef idx="1">
+              <a:schemeClr val="accent1"/>
+            </a:lnRef>
+            <a:fillRef idx="0">
+              <a:schemeClr val="accent1"/>
+            </a:fillRef>
+            <a:effectRef idx="0">
+              <a:schemeClr val="accent1"/>
+            </a:effectRef>
+            <a:fontRef idx="minor">
+              <a:schemeClr val="tx1"/>
+            </a:fontRef>
+          </p:style>
+        </p:cxnSp>
+        <p:cxnSp>
+          <p:nvCxnSpPr>
+            <p:cNvPr id="8" name="Straight Connector 7"/>
+            <p:cNvCxnSpPr/>
+            <p:nvPr/>
+          </p:nvCxnSpPr>
+          <p:spPr>
+            <a:xfrm flipH="1">
+              <a:off x="6765677" y="3358293"/>
+              <a:ext cx="4369355" cy="0"/>
+            </a:xfrm>
+            <a:prstGeom prst="line">
+              <a:avLst/>
+            </a:prstGeom>
+            <a:ln w="38100">
+              <a:solidFill>
+                <a:schemeClr val="tx1"/>
+              </a:solidFill>
+              <a:tailEnd type="none"/>
+            </a:ln>
+          </p:spPr>
+          <p:style>
+            <a:lnRef idx="1">
+              <a:schemeClr val="accent1"/>
+            </a:lnRef>
+            <a:fillRef idx="0">
+              <a:schemeClr val="accent1"/>
+            </a:fillRef>
+            <a:effectRef idx="0">
+              <a:schemeClr val="accent1"/>
+            </a:effectRef>
+            <a:fontRef idx="minor">
+              <a:schemeClr val="tx1"/>
+            </a:fontRef>
+          </p:style>
+        </p:cxnSp>
+        <p:cxnSp>
+          <p:nvCxnSpPr>
+            <p:cNvPr id="9" name="Straight Connector 8"/>
+            <p:cNvCxnSpPr/>
+            <p:nvPr/>
+          </p:nvCxnSpPr>
+          <p:spPr>
+            <a:xfrm flipH="1" flipV="1">
+              <a:off x="10133249" y="1414091"/>
+              <a:ext cx="0" cy="834906"/>
+            </a:xfrm>
+            <a:prstGeom prst="line">
+              <a:avLst/>
+            </a:prstGeom>
+            <a:ln w="38100">
+              <a:solidFill>
+                <a:schemeClr val="tx1"/>
+              </a:solidFill>
+            </a:ln>
+          </p:spPr>
+          <p:style>
+            <a:lnRef idx="1">
+              <a:schemeClr val="accent1"/>
+            </a:lnRef>
+            <a:fillRef idx="0">
+              <a:schemeClr val="accent1"/>
+            </a:fillRef>
+            <a:effectRef idx="0">
+              <a:schemeClr val="accent1"/>
+            </a:effectRef>
+            <a:fontRef idx="minor">
+              <a:schemeClr val="tx1"/>
+            </a:fontRef>
+          </p:style>
+        </p:cxnSp>
+        <p:cxnSp>
+          <p:nvCxnSpPr>
+            <p:cNvPr id="10" name="Straight Connector 9"/>
+            <p:cNvCxnSpPr/>
+            <p:nvPr/>
+          </p:nvCxnSpPr>
+          <p:spPr>
+            <a:xfrm flipH="1" flipV="1">
+              <a:off x="10133250" y="2466279"/>
+              <a:ext cx="0" cy="892014"/>
+            </a:xfrm>
+            <a:prstGeom prst="line">
+              <a:avLst/>
+            </a:prstGeom>
+            <a:ln w="38100">
+              <a:solidFill>
+                <a:schemeClr val="tx1"/>
+              </a:solidFill>
+            </a:ln>
+          </p:spPr>
+          <p:style>
+            <a:lnRef idx="1">
+              <a:schemeClr val="accent1"/>
+            </a:lnRef>
+            <a:fillRef idx="0">
+              <a:schemeClr val="accent1"/>
+            </a:fillRef>
+            <a:effectRef idx="0">
+              <a:schemeClr val="accent1"/>
+            </a:effectRef>
+            <a:fontRef idx="minor">
+              <a:schemeClr val="tx1"/>
+            </a:fontRef>
+          </p:style>
+        </p:cxnSp>
+        <p:cxnSp>
+          <p:nvCxnSpPr>
+            <p:cNvPr id="11" name="Straight Connector 10"/>
+            <p:cNvCxnSpPr/>
+            <p:nvPr/>
+          </p:nvCxnSpPr>
+          <p:spPr>
+            <a:xfrm flipV="1">
+              <a:off x="6794964" y="1350791"/>
+              <a:ext cx="0" cy="644288"/>
+            </a:xfrm>
+            <a:prstGeom prst="line">
+              <a:avLst/>
+            </a:prstGeom>
+            <a:ln w="38100">
+              <a:solidFill>
+                <a:schemeClr val="tx1"/>
+              </a:solidFill>
+            </a:ln>
+          </p:spPr>
+          <p:style>
+            <a:lnRef idx="1">
+              <a:schemeClr val="accent1"/>
+            </a:lnRef>
+            <a:fillRef idx="0">
+              <a:schemeClr val="accent1"/>
+            </a:fillRef>
+            <a:effectRef idx="0">
+              <a:schemeClr val="accent1"/>
+            </a:effectRef>
+            <a:fontRef idx="minor">
+              <a:schemeClr val="tx1"/>
+            </a:fontRef>
+          </p:style>
+        </p:cxnSp>
+        <p:cxnSp>
+          <p:nvCxnSpPr>
+            <p:cNvPr id="12" name="Straight Connector 11"/>
+            <p:cNvCxnSpPr/>
+            <p:nvPr/>
+          </p:nvCxnSpPr>
+          <p:spPr>
+            <a:xfrm flipH="1" flipV="1">
+              <a:off x="6765677" y="2808526"/>
+              <a:ext cx="0" cy="566526"/>
+            </a:xfrm>
+            <a:prstGeom prst="line">
+              <a:avLst/>
+            </a:prstGeom>
+            <a:ln w="38100">
+              <a:solidFill>
+                <a:schemeClr val="tx1"/>
+              </a:solidFill>
+            </a:ln>
+          </p:spPr>
+          <p:style>
+            <a:lnRef idx="1">
+              <a:schemeClr val="accent1"/>
+            </a:lnRef>
+            <a:fillRef idx="0">
+              <a:schemeClr val="accent1"/>
+            </a:fillRef>
+            <a:effectRef idx="0">
+              <a:schemeClr val="accent1"/>
+            </a:effectRef>
+            <a:fontRef idx="minor">
+              <a:schemeClr val="tx1"/>
+            </a:fontRef>
+          </p:style>
+        </p:cxnSp>
+        <p:sp>
+          <p:nvSpPr>
+            <p:cNvPr id="13" name="TextBox 12"/>
+            <p:cNvSpPr txBox="1"/>
+            <p:nvPr/>
+          </p:nvSpPr>
+          <p:spPr>
+            <a:xfrm>
+              <a:off x="7498693" y="751632"/>
+              <a:ext cx="492443" cy="369332"/>
+            </a:xfrm>
+            <a:prstGeom prst="rect">
+              <a:avLst/>
+            </a:prstGeom>
+            <a:noFill/>
+          </p:spPr>
+          <p:txBody>
+            <a:bodyPr wrap="none" rtlCol="0">
+              <a:spAutoFit/>
+            </a:bodyPr>
+            <a:lstStyle/>
+            <a:p>
+              <a:r>
+                <a:rPr lang="en-US" b="1" dirty="0">
+                  <a:latin typeface="Cambria" panose="02040503050406030204" pitchFamily="18" charset="0"/>
+                </a:rPr>
+                <a:t>1</a:t>
+              </a:r>
+              <a:r>
+                <a:rPr lang="el-GR" b="1" dirty="0">
+                  <a:latin typeface="Cambria" panose="02040503050406030204" pitchFamily="18" charset="0"/>
+                </a:rPr>
+                <a:t>Ω</a:t>
+              </a:r>
+              <a:endParaRPr lang="en-US" b="1" dirty="0">
+                <a:latin typeface="Cambria" panose="02040503050406030204" pitchFamily="18" charset="0"/>
+              </a:endParaRPr>
+            </a:p>
+          </p:txBody>
+        </p:sp>
+        <p:sp>
+          <p:nvSpPr>
+            <p:cNvPr id="16" name="Freeform 41"/>
+            <p:cNvSpPr>
+              <a:spLocks/>
+            </p:cNvSpPr>
+            <p:nvPr/>
+          </p:nvSpPr>
+          <p:spPr bwMode="auto">
+            <a:xfrm rot="-10800000" flipV="1">
+              <a:off x="8613819" y="1202429"/>
+              <a:ext cx="258036" cy="202294"/>
+            </a:xfrm>
+            <a:custGeom>
+              <a:avLst/>
+              <a:gdLst>
+                <a:gd name="T0" fmla="*/ 0 w 288"/>
+                <a:gd name="T1" fmla="*/ 288 h 288"/>
+                <a:gd name="T2" fmla="*/ 144 w 288"/>
+                <a:gd name="T3" fmla="*/ 0 h 288"/>
+                <a:gd name="T4" fmla="*/ 288 w 288"/>
+                <a:gd name="T5" fmla="*/ 288 h 288"/>
+                <a:gd name="T6" fmla="*/ 0 60000 65536"/>
+                <a:gd name="T7" fmla="*/ 0 60000 65536"/>
+                <a:gd name="T8" fmla="*/ 0 60000 65536"/>
+                <a:gd name="T9" fmla="*/ 0 w 288"/>
+                <a:gd name="T10" fmla="*/ 0 h 288"/>
+                <a:gd name="T11" fmla="*/ 288 w 288"/>
+                <a:gd name="T12" fmla="*/ 288 h 288"/>
+              </a:gdLst>
+              <a:ahLst/>
+              <a:cxnLst>
+                <a:cxn ang="T6">
+                  <a:pos x="T0" y="T1"/>
+                </a:cxn>
+                <a:cxn ang="T7">
+                  <a:pos x="T2" y="T3"/>
+                </a:cxn>
+                <a:cxn ang="T8">
+                  <a:pos x="T4" y="T5"/>
+                </a:cxn>
+              </a:cxnLst>
+              <a:rect l="T9" t="T10" r="T11" b="T12"/>
+              <a:pathLst>
+                <a:path w="288" h="288">
+                  <a:moveTo>
+                    <a:pt x="0" y="288"/>
+                  </a:moveTo>
+                  <a:cubicBezTo>
+                    <a:pt x="48" y="144"/>
+                    <a:pt x="96" y="0"/>
+                    <a:pt x="144" y="0"/>
+                  </a:cubicBezTo>
+                  <a:cubicBezTo>
+                    <a:pt x="192" y="0"/>
+                    <a:pt x="264" y="240"/>
+                    <a:pt x="288" y="288"/>
+                  </a:cubicBezTo>
+                </a:path>
+              </a:pathLst>
+            </a:custGeom>
+            <a:noFill/>
+            <a:ln w="25400">
+              <a:solidFill>
+                <a:srgbClr val="FF0000"/>
+              </a:solidFill>
+              <a:round/>
+              <a:headEnd/>
+              <a:tailEnd/>
+            </a:ln>
+          </p:spPr>
+          <p:txBody>
+            <a:bodyPr/>
+            <a:lstStyle/>
+            <a:p>
+              <a:endParaRPr lang="en-US"/>
+            </a:p>
+          </p:txBody>
+        </p:sp>
+        <p:sp>
+          <p:nvSpPr>
+            <p:cNvPr id="17" name="Freeform 41"/>
+            <p:cNvSpPr>
+              <a:spLocks/>
+            </p:cNvSpPr>
+            <p:nvPr/>
+          </p:nvSpPr>
+          <p:spPr bwMode="auto">
+            <a:xfrm rot="-10800000" flipV="1">
+              <a:off x="8871855" y="1207113"/>
+              <a:ext cx="258036" cy="202294"/>
+            </a:xfrm>
+            <a:custGeom>
+              <a:avLst/>
+              <a:gdLst>
+                <a:gd name="T0" fmla="*/ 0 w 288"/>
+                <a:gd name="T1" fmla="*/ 288 h 288"/>
+                <a:gd name="T2" fmla="*/ 144 w 288"/>
+                <a:gd name="T3" fmla="*/ 0 h 288"/>
+                <a:gd name="T4" fmla="*/ 288 w 288"/>
+                <a:gd name="T5" fmla="*/ 288 h 288"/>
+                <a:gd name="T6" fmla="*/ 0 60000 65536"/>
+                <a:gd name="T7" fmla="*/ 0 60000 65536"/>
+                <a:gd name="T8" fmla="*/ 0 60000 65536"/>
+                <a:gd name="T9" fmla="*/ 0 w 288"/>
+                <a:gd name="T10" fmla="*/ 0 h 288"/>
+                <a:gd name="T11" fmla="*/ 288 w 288"/>
+                <a:gd name="T12" fmla="*/ 288 h 288"/>
+              </a:gdLst>
+              <a:ahLst/>
+              <a:cxnLst>
+                <a:cxn ang="T6">
+                  <a:pos x="T0" y="T1"/>
+                </a:cxn>
+                <a:cxn ang="T7">
+                  <a:pos x="T2" y="T3"/>
+                </a:cxn>
+                <a:cxn ang="T8">
+                  <a:pos x="T4" y="T5"/>
+                </a:cxn>
+              </a:cxnLst>
+              <a:rect l="T9" t="T10" r="T11" b="T12"/>
+              <a:pathLst>
+                <a:path w="288" h="288">
+                  <a:moveTo>
+                    <a:pt x="0" y="288"/>
+                  </a:moveTo>
+                  <a:cubicBezTo>
+                    <a:pt x="48" y="144"/>
+                    <a:pt x="96" y="0"/>
+                    <a:pt x="144" y="0"/>
+                  </a:cubicBezTo>
+                  <a:cubicBezTo>
+                    <a:pt x="192" y="0"/>
+                    <a:pt x="264" y="240"/>
+                    <a:pt x="288" y="288"/>
+                  </a:cubicBezTo>
+                </a:path>
+              </a:pathLst>
+            </a:custGeom>
+            <a:noFill/>
+            <a:ln w="25400">
+              <a:solidFill>
+                <a:srgbClr val="FF0000"/>
+              </a:solidFill>
+              <a:round/>
+              <a:headEnd/>
+              <a:tailEnd/>
+            </a:ln>
+          </p:spPr>
+          <p:txBody>
+            <a:bodyPr/>
+            <a:lstStyle/>
+            <a:p>
+              <a:endParaRPr lang="en-US"/>
+            </a:p>
+          </p:txBody>
+        </p:sp>
+        <p:sp>
+          <p:nvSpPr>
+            <p:cNvPr id="18" name="Freeform 41"/>
+            <p:cNvSpPr>
+              <a:spLocks/>
+            </p:cNvSpPr>
+            <p:nvPr/>
+          </p:nvSpPr>
+          <p:spPr bwMode="auto">
+            <a:xfrm rot="-10800000" flipV="1">
+              <a:off x="9121026" y="1211797"/>
+              <a:ext cx="258036" cy="202294"/>
+            </a:xfrm>
+            <a:custGeom>
+              <a:avLst/>
+              <a:gdLst>
+                <a:gd name="T0" fmla="*/ 0 w 288"/>
+                <a:gd name="T1" fmla="*/ 288 h 288"/>
+                <a:gd name="T2" fmla="*/ 144 w 288"/>
+                <a:gd name="T3" fmla="*/ 0 h 288"/>
+                <a:gd name="T4" fmla="*/ 288 w 288"/>
+                <a:gd name="T5" fmla="*/ 288 h 288"/>
+                <a:gd name="T6" fmla="*/ 0 60000 65536"/>
+                <a:gd name="T7" fmla="*/ 0 60000 65536"/>
+                <a:gd name="T8" fmla="*/ 0 60000 65536"/>
+                <a:gd name="T9" fmla="*/ 0 w 288"/>
+                <a:gd name="T10" fmla="*/ 0 h 288"/>
+                <a:gd name="T11" fmla="*/ 288 w 288"/>
+                <a:gd name="T12" fmla="*/ 288 h 288"/>
+              </a:gdLst>
+              <a:ahLst/>
+              <a:cxnLst>
+                <a:cxn ang="T6">
+                  <a:pos x="T0" y="T1"/>
+                </a:cxn>
+                <a:cxn ang="T7">
+                  <a:pos x="T2" y="T3"/>
+                </a:cxn>
+                <a:cxn ang="T8">
+                  <a:pos x="T4" y="T5"/>
+                </a:cxn>
+              </a:cxnLst>
+              <a:rect l="T9" t="T10" r="T11" b="T12"/>
+              <a:pathLst>
+                <a:path w="288" h="288">
+                  <a:moveTo>
+                    <a:pt x="0" y="288"/>
+                  </a:moveTo>
+                  <a:cubicBezTo>
+                    <a:pt x="48" y="144"/>
+                    <a:pt x="96" y="0"/>
+                    <a:pt x="144" y="0"/>
+                  </a:cubicBezTo>
+                  <a:cubicBezTo>
+                    <a:pt x="192" y="0"/>
+                    <a:pt x="264" y="240"/>
+                    <a:pt x="288" y="288"/>
+                  </a:cubicBezTo>
+                </a:path>
+              </a:pathLst>
+            </a:custGeom>
+            <a:noFill/>
+            <a:ln w="25400">
+              <a:solidFill>
+                <a:srgbClr val="FF0000"/>
+              </a:solidFill>
+              <a:round/>
+              <a:headEnd/>
+              <a:tailEnd/>
+            </a:ln>
+          </p:spPr>
+          <p:txBody>
+            <a:bodyPr/>
+            <a:lstStyle/>
+            <a:p>
+              <a:endParaRPr lang="en-US"/>
+            </a:p>
+          </p:txBody>
+        </p:sp>
+        <p:cxnSp>
+          <p:nvCxnSpPr>
+            <p:cNvPr id="19" name="Straight Connector 18"/>
+            <p:cNvCxnSpPr/>
+            <p:nvPr/>
+          </p:nvCxnSpPr>
+          <p:spPr>
+            <a:xfrm flipV="1">
+              <a:off x="7355819" y="1161451"/>
+              <a:ext cx="142874" cy="228600"/>
+            </a:xfrm>
+            <a:prstGeom prst="line">
+              <a:avLst/>
+            </a:prstGeom>
+            <a:ln w="38100">
+              <a:solidFill>
+                <a:srgbClr val="0000FF"/>
+              </a:solidFill>
+            </a:ln>
+          </p:spPr>
+          <p:style>
+            <a:lnRef idx="1">
+              <a:schemeClr val="accent1"/>
+            </a:lnRef>
+            <a:fillRef idx="0">
+              <a:schemeClr val="accent1"/>
+            </a:fillRef>
+            <a:effectRef idx="0">
+              <a:schemeClr val="accent1"/>
+            </a:effectRef>
+            <a:fontRef idx="minor">
+              <a:schemeClr val="tx1"/>
+            </a:fontRef>
+          </p:style>
+        </p:cxnSp>
+        <p:cxnSp>
+          <p:nvCxnSpPr>
+            <p:cNvPr id="20" name="Straight Connector 19"/>
+            <p:cNvCxnSpPr/>
+            <p:nvPr/>
+          </p:nvCxnSpPr>
+          <p:spPr>
+            <a:xfrm flipV="1">
+              <a:off x="7665382" y="1161451"/>
+              <a:ext cx="189311" cy="423863"/>
+            </a:xfrm>
+            <a:prstGeom prst="line">
+              <a:avLst/>
+            </a:prstGeom>
+            <a:ln w="38100">
+              <a:solidFill>
+                <a:srgbClr val="0000FF"/>
+              </a:solidFill>
+            </a:ln>
+          </p:spPr>
+          <p:style>
+            <a:lnRef idx="1">
+              <a:schemeClr val="accent1"/>
+            </a:lnRef>
+            <a:fillRef idx="0">
+              <a:schemeClr val="accent1"/>
+            </a:fillRef>
+            <a:effectRef idx="0">
+              <a:schemeClr val="accent1"/>
+            </a:effectRef>
+            <a:fontRef idx="minor">
+              <a:schemeClr val="tx1"/>
+            </a:fontRef>
+          </p:style>
+        </p:cxnSp>
+        <p:cxnSp>
+          <p:nvCxnSpPr>
+            <p:cNvPr id="21" name="Straight Connector 20"/>
+            <p:cNvCxnSpPr/>
+            <p:nvPr/>
+          </p:nvCxnSpPr>
+          <p:spPr>
+            <a:xfrm>
+              <a:off x="7498696" y="1161451"/>
+              <a:ext cx="166686" cy="423862"/>
+            </a:xfrm>
+            <a:prstGeom prst="line">
+              <a:avLst/>
+            </a:prstGeom>
+            <a:ln w="38100">
+              <a:solidFill>
+                <a:srgbClr val="0000FF"/>
+              </a:solidFill>
+            </a:ln>
+          </p:spPr>
+          <p:style>
+            <a:lnRef idx="1">
+              <a:schemeClr val="accent1"/>
+            </a:lnRef>
+            <a:fillRef idx="0">
+              <a:schemeClr val="accent1"/>
+            </a:fillRef>
+            <a:effectRef idx="0">
+              <a:schemeClr val="accent1"/>
+            </a:effectRef>
+            <a:fontRef idx="minor">
+              <a:schemeClr val="tx1"/>
+            </a:fontRef>
+          </p:style>
+        </p:cxnSp>
+        <p:cxnSp>
+          <p:nvCxnSpPr>
+            <p:cNvPr id="22" name="Straight Connector 21"/>
+            <p:cNvCxnSpPr/>
+            <p:nvPr/>
+          </p:nvCxnSpPr>
+          <p:spPr>
+            <a:xfrm flipV="1">
+              <a:off x="8029124" y="1373382"/>
+              <a:ext cx="71438" cy="211931"/>
+            </a:xfrm>
+            <a:prstGeom prst="line">
+              <a:avLst/>
+            </a:prstGeom>
+            <a:ln w="38100">
+              <a:solidFill>
+                <a:srgbClr val="0000FF"/>
+              </a:solidFill>
+            </a:ln>
+          </p:spPr>
+          <p:style>
+            <a:lnRef idx="1">
+              <a:schemeClr val="accent1"/>
+            </a:lnRef>
+            <a:fillRef idx="0">
+              <a:schemeClr val="accent1"/>
+            </a:fillRef>
+            <a:effectRef idx="0">
+              <a:schemeClr val="accent1"/>
+            </a:effectRef>
+            <a:fontRef idx="minor">
+              <a:schemeClr val="tx1"/>
+            </a:fontRef>
+          </p:style>
+        </p:cxnSp>
+        <p:cxnSp>
+          <p:nvCxnSpPr>
+            <p:cNvPr id="23" name="Straight Connector 22"/>
+            <p:cNvCxnSpPr/>
+            <p:nvPr/>
+          </p:nvCxnSpPr>
+          <p:spPr>
+            <a:xfrm>
+              <a:off x="7854693" y="1178120"/>
+              <a:ext cx="166686" cy="423862"/>
+            </a:xfrm>
+            <a:prstGeom prst="line">
+              <a:avLst/>
+            </a:prstGeom>
+            <a:ln w="38100">
+              <a:solidFill>
+                <a:srgbClr val="0000FF"/>
+              </a:solidFill>
+            </a:ln>
+          </p:spPr>
+          <p:style>
+            <a:lnRef idx="1">
+              <a:schemeClr val="accent1"/>
+            </a:lnRef>
+            <a:fillRef idx="0">
+              <a:schemeClr val="accent1"/>
+            </a:fillRef>
+            <a:effectRef idx="0">
+              <a:schemeClr val="accent1"/>
+            </a:effectRef>
+            <a:fontRef idx="minor">
+              <a:schemeClr val="tx1"/>
+            </a:fontRef>
+          </p:style>
+        </p:cxnSp>
+        <p:cxnSp>
+          <p:nvCxnSpPr>
+            <p:cNvPr id="24" name="Straight Connector 23"/>
+            <p:cNvCxnSpPr/>
+            <p:nvPr/>
+          </p:nvCxnSpPr>
+          <p:spPr>
+            <a:xfrm flipH="1" flipV="1">
+              <a:off x="8094940" y="1384574"/>
+              <a:ext cx="518879" cy="0"/>
+            </a:xfrm>
+            <a:prstGeom prst="line">
+              <a:avLst/>
+            </a:prstGeom>
+            <a:ln w="38100">
+              <a:solidFill>
+                <a:schemeClr val="tx1"/>
+              </a:solidFill>
+            </a:ln>
+          </p:spPr>
+          <p:style>
+            <a:lnRef idx="1">
+              <a:schemeClr val="accent1"/>
+            </a:lnRef>
+            <a:fillRef idx="0">
+              <a:schemeClr val="accent1"/>
+            </a:fillRef>
+            <a:effectRef idx="0">
+              <a:schemeClr val="accent1"/>
+            </a:effectRef>
+            <a:fontRef idx="minor">
+              <a:schemeClr val="tx1"/>
+            </a:fontRef>
+          </p:style>
+        </p:cxnSp>
+        <p:cxnSp>
+          <p:nvCxnSpPr>
+            <p:cNvPr id="25" name="Straight Connector 24"/>
+            <p:cNvCxnSpPr/>
+            <p:nvPr/>
+          </p:nvCxnSpPr>
+          <p:spPr>
+            <a:xfrm flipH="1" flipV="1">
+              <a:off x="9757014" y="2250001"/>
+              <a:ext cx="752475" cy="0"/>
+            </a:xfrm>
+            <a:prstGeom prst="line">
+              <a:avLst/>
+            </a:prstGeom>
+            <a:ln w="38100">
+              <a:solidFill>
+                <a:srgbClr val="9933FF"/>
+              </a:solidFill>
+            </a:ln>
+          </p:spPr>
+          <p:style>
+            <a:lnRef idx="1">
+              <a:schemeClr val="accent1"/>
+            </a:lnRef>
+            <a:fillRef idx="0">
+              <a:schemeClr val="accent1"/>
+            </a:fillRef>
+            <a:effectRef idx="0">
+              <a:schemeClr val="accent1"/>
+            </a:effectRef>
+            <a:fontRef idx="minor">
+              <a:schemeClr val="tx1"/>
+            </a:fontRef>
+          </p:style>
+        </p:cxnSp>
+        <p:sp>
+          <p:nvSpPr>
+            <p:cNvPr id="26" name="Arc 25"/>
+            <p:cNvSpPr/>
+            <p:nvPr/>
+          </p:nvSpPr>
+          <p:spPr>
+            <a:xfrm>
+              <a:off x="9576037" y="2466279"/>
+              <a:ext cx="1114425" cy="957262"/>
+            </a:xfrm>
+            <a:prstGeom prst="arc">
+              <a:avLst>
+                <a:gd name="adj1" fmla="val 13447939"/>
+                <a:gd name="adj2" fmla="val 19266933"/>
+              </a:avLst>
+            </a:prstGeom>
+            <a:ln w="38100">
+              <a:solidFill>
+                <a:srgbClr val="9933FF"/>
+              </a:solidFill>
+            </a:ln>
+          </p:spPr>
+          <p:style>
+            <a:lnRef idx="1">
+              <a:schemeClr val="accent1"/>
+            </a:lnRef>
+            <a:fillRef idx="0">
+              <a:schemeClr val="accent1"/>
+            </a:fillRef>
+            <a:effectRef idx="0">
+              <a:schemeClr val="accent1"/>
+            </a:effectRef>
+            <a:fontRef idx="minor">
+              <a:schemeClr val="tx1"/>
+            </a:fontRef>
+          </p:style>
+          <p:txBody>
+            <a:bodyPr rtlCol="0" anchor="ctr"/>
+            <a:lstStyle/>
+            <a:p>
+              <a:pPr algn="ctr"/>
+              <a:endParaRPr lang="en-US"/>
+            </a:p>
+          </p:txBody>
+        </p:sp>
+        <p:sp>
+          <p:nvSpPr>
+            <p:cNvPr id="31" name="TextBox 30"/>
+            <p:cNvSpPr txBox="1"/>
+            <p:nvPr/>
+          </p:nvSpPr>
+          <p:spPr>
+            <a:xfrm>
+              <a:off x="8757601" y="772770"/>
+              <a:ext cx="492443" cy="369332"/>
+            </a:xfrm>
+            <a:prstGeom prst="rect">
+              <a:avLst/>
+            </a:prstGeom>
+            <a:noFill/>
+          </p:spPr>
+          <p:txBody>
+            <a:bodyPr wrap="none" rtlCol="0">
+              <a:spAutoFit/>
+            </a:bodyPr>
+            <a:lstStyle/>
+            <a:p>
+              <a:r>
+                <a:rPr lang="en-US" b="1" dirty="0">
+                  <a:latin typeface="Cambria" panose="02040503050406030204" pitchFamily="18" charset="0"/>
+                </a:rPr>
+                <a:t>1H</a:t>
+              </a:r>
+            </a:p>
+          </p:txBody>
+        </p:sp>
+        <p:sp>
+          <p:nvSpPr>
+            <p:cNvPr id="32" name="TextBox 31"/>
+            <p:cNvSpPr txBox="1"/>
+            <p:nvPr/>
+          </p:nvSpPr>
+          <p:spPr>
+            <a:xfrm>
+              <a:off x="9308994" y="2164841"/>
+              <a:ext cx="447558" cy="369332"/>
+            </a:xfrm>
+            <a:prstGeom prst="rect">
+              <a:avLst/>
+            </a:prstGeom>
+            <a:noFill/>
+          </p:spPr>
+          <p:txBody>
+            <a:bodyPr wrap="none" rtlCol="0">
+              <a:spAutoFit/>
+            </a:bodyPr>
+            <a:lstStyle/>
+            <a:p>
+              <a:r>
+                <a:rPr lang="en-US" b="1" dirty="0">
+                  <a:latin typeface="Cambria" panose="02040503050406030204" pitchFamily="18" charset="0"/>
+                </a:rPr>
+                <a:t>1F</a:t>
+              </a:r>
+            </a:p>
+          </p:txBody>
+        </p:sp>
+        <p:sp>
+          <p:nvSpPr>
+            <p:cNvPr id="35" name="TextBox 34"/>
+            <p:cNvSpPr txBox="1"/>
+            <p:nvPr/>
+          </p:nvSpPr>
+          <p:spPr>
+            <a:xfrm>
+              <a:off x="5375213" y="2322784"/>
+              <a:ext cx="795347" cy="369332"/>
+            </a:xfrm>
+            <a:prstGeom prst="rect">
+              <a:avLst/>
+            </a:prstGeom>
+            <a:noFill/>
+          </p:spPr>
+          <p:txBody>
+            <a:bodyPr wrap="none" rtlCol="0">
+              <a:spAutoFit/>
+            </a:bodyPr>
+            <a:lstStyle/>
+            <a:p>
+              <a:r>
+                <a:rPr lang="en-US" b="1" dirty="0">
+                  <a:latin typeface="Cambria" panose="02040503050406030204" pitchFamily="18" charset="0"/>
+                </a:rPr>
+                <a:t>V</a:t>
+              </a:r>
+              <a:r>
+                <a:rPr lang="en-US" b="1" baseline="-25000" dirty="0">
+                  <a:latin typeface="Cambria" panose="02040503050406030204" pitchFamily="18" charset="0"/>
+                </a:rPr>
+                <a:t>in</a:t>
+              </a:r>
+              <a:r>
+                <a:rPr lang="en-US" b="1" dirty="0">
+                  <a:latin typeface="Cambria" panose="02040503050406030204" pitchFamily="18" charset="0"/>
+                </a:rPr>
+                <a:t>(t) </a:t>
+              </a:r>
+            </a:p>
+          </p:txBody>
+        </p:sp>
+        <p:sp>
+          <p:nvSpPr>
+            <p:cNvPr id="40" name="TextBox 39"/>
+            <p:cNvSpPr txBox="1"/>
+            <p:nvPr/>
+          </p:nvSpPr>
+          <p:spPr>
+            <a:xfrm>
+              <a:off x="11117924" y="1430850"/>
+              <a:ext cx="320922" cy="369332"/>
+            </a:xfrm>
+            <a:prstGeom prst="rect">
+              <a:avLst/>
+            </a:prstGeom>
+            <a:noFill/>
+          </p:spPr>
+          <p:txBody>
+            <a:bodyPr wrap="none" rtlCol="0">
+              <a:spAutoFit/>
+            </a:bodyPr>
+            <a:lstStyle/>
+            <a:p>
+              <a:r>
+                <a:rPr lang="en-US" b="1" dirty="0">
+                  <a:latin typeface="Cambria" panose="02040503050406030204" pitchFamily="18" charset="0"/>
+                </a:rPr>
+                <a:t>+</a:t>
+              </a:r>
+            </a:p>
+          </p:txBody>
+        </p:sp>
+        <p:sp>
+          <p:nvSpPr>
+            <p:cNvPr id="41" name="TextBox 40"/>
+            <p:cNvSpPr txBox="1"/>
+            <p:nvPr/>
+          </p:nvSpPr>
+          <p:spPr>
+            <a:xfrm>
+              <a:off x="11135032" y="2972203"/>
+              <a:ext cx="263214" cy="369332"/>
+            </a:xfrm>
+            <a:prstGeom prst="rect">
+              <a:avLst/>
+            </a:prstGeom>
+            <a:noFill/>
+          </p:spPr>
+          <p:txBody>
+            <a:bodyPr wrap="none" rtlCol="0">
+              <a:spAutoFit/>
+            </a:bodyPr>
+            <a:lstStyle/>
+            <a:p>
+              <a:r>
+                <a:rPr lang="en-US" b="1" dirty="0">
+                  <a:latin typeface="Cambria" panose="02040503050406030204" pitchFamily="18" charset="0"/>
+                </a:rPr>
+                <a:t>-</a:t>
+              </a:r>
+            </a:p>
+          </p:txBody>
+        </p:sp>
+        <p:sp>
+          <p:nvSpPr>
+            <p:cNvPr id="42" name="TextBox 41"/>
+            <p:cNvSpPr txBox="1"/>
+            <p:nvPr/>
+          </p:nvSpPr>
+          <p:spPr>
+            <a:xfrm>
+              <a:off x="6663357" y="2425988"/>
+              <a:ext cx="263214" cy="369332"/>
+            </a:xfrm>
+            <a:prstGeom prst="rect">
+              <a:avLst/>
+            </a:prstGeom>
+            <a:noFill/>
+          </p:spPr>
+          <p:txBody>
+            <a:bodyPr wrap="none" rtlCol="0">
+              <a:spAutoFit/>
+            </a:bodyPr>
+            <a:lstStyle/>
+            <a:p>
+              <a:r>
+                <a:rPr lang="en-US" b="1" dirty="0">
+                  <a:latin typeface="Cambria" panose="02040503050406030204" pitchFamily="18" charset="0"/>
+                </a:rPr>
+                <a:t>-</a:t>
+              </a:r>
+            </a:p>
+          </p:txBody>
+        </p:sp>
+        <p:sp>
+          <p:nvSpPr>
+            <p:cNvPr id="43" name="TextBox 42"/>
+            <p:cNvSpPr txBox="1"/>
+            <p:nvPr/>
+          </p:nvSpPr>
+          <p:spPr>
+            <a:xfrm>
+              <a:off x="6619112" y="1925316"/>
+              <a:ext cx="320922" cy="369332"/>
+            </a:xfrm>
+            <a:prstGeom prst="rect">
+              <a:avLst/>
+            </a:prstGeom>
+            <a:noFill/>
+          </p:spPr>
+          <p:txBody>
+            <a:bodyPr wrap="none" rtlCol="0">
+              <a:spAutoFit/>
+            </a:bodyPr>
+            <a:lstStyle/>
+            <a:p>
+              <a:r>
+                <a:rPr lang="en-US" b="1" dirty="0">
+                  <a:latin typeface="Cambria" panose="02040503050406030204" pitchFamily="18" charset="0"/>
+                </a:rPr>
+                <a:t>+</a:t>
+              </a:r>
+            </a:p>
+          </p:txBody>
+        </p:sp>
+        <p:sp>
+          <p:nvSpPr>
+            <p:cNvPr id="44" name="TextBox 43"/>
+            <p:cNvSpPr txBox="1"/>
+            <p:nvPr/>
+          </p:nvSpPr>
+          <p:spPr>
+            <a:xfrm>
+              <a:off x="10880712" y="2248997"/>
+              <a:ext cx="936603" cy="369332"/>
+            </a:xfrm>
+            <a:prstGeom prst="rect">
+              <a:avLst/>
+            </a:prstGeom>
+            <a:noFill/>
+          </p:spPr>
+          <p:txBody>
+            <a:bodyPr wrap="none" rtlCol="0">
+              <a:spAutoFit/>
+            </a:bodyPr>
+            <a:lstStyle/>
+            <a:p>
+              <a:r>
+                <a:rPr lang="en-US" b="1" dirty="0" err="1">
+                  <a:latin typeface="Cambria" panose="02040503050406030204" pitchFamily="18" charset="0"/>
+                </a:rPr>
+                <a:t>V</a:t>
+              </a:r>
+              <a:r>
+                <a:rPr lang="en-US" b="1" baseline="-25000" dirty="0" err="1">
+                  <a:latin typeface="Cambria" panose="02040503050406030204" pitchFamily="18" charset="0"/>
+                </a:rPr>
+                <a:t>Out</a:t>
+              </a:r>
+              <a:r>
+                <a:rPr lang="en-US" b="1" baseline="-25000" dirty="0">
+                  <a:latin typeface="Cambria" panose="02040503050406030204" pitchFamily="18" charset="0"/>
+                </a:rPr>
+                <a:t> </a:t>
+              </a:r>
+              <a:r>
+                <a:rPr lang="en-US" b="1" dirty="0">
+                  <a:latin typeface="Cambria" panose="02040503050406030204" pitchFamily="18" charset="0"/>
+                </a:rPr>
+                <a:t>(t) </a:t>
+              </a:r>
+            </a:p>
+          </p:txBody>
+        </p:sp>
+      </p:grpSp>
+      <p:sp>
+        <p:nvSpPr>
+          <p:cNvPr id="45" name="Rectangle 44"/>
+          <p:cNvSpPr/>
+          <p:nvPr/>
+        </p:nvSpPr>
+        <p:spPr>
+          <a:xfrm>
+            <a:off x="385019" y="1004659"/>
+            <a:ext cx="6701100" cy="1015663"/>
+          </a:xfrm>
+          <a:prstGeom prst="rect">
+            <a:avLst/>
+          </a:prstGeom>
+        </p:spPr>
+        <p:txBody>
+          <a:bodyPr wrap="square">
+            <a:spAutoFit/>
+          </a:bodyPr>
+          <a:lstStyle/>
+          <a:p>
+            <a:pPr algn="just"/>
+            <a:r>
+              <a:rPr lang="en-US" sz="2000" dirty="0">
+                <a:latin typeface="Times New Roman" panose="02020603050405020304" pitchFamily="18" charset="0"/>
+                <a:cs typeface="Times New Roman" panose="02020603050405020304" pitchFamily="18" charset="0"/>
+              </a:rPr>
+              <a:t>Find </a:t>
+            </a:r>
+            <a:r>
+              <a:rPr lang="en-US" sz="2000" dirty="0" err="1">
+                <a:latin typeface="Times New Roman" panose="02020603050405020304" pitchFamily="18" charset="0"/>
+                <a:cs typeface="Times New Roman" panose="02020603050405020304" pitchFamily="18" charset="0"/>
+              </a:rPr>
+              <a:t>V</a:t>
+            </a:r>
+            <a:r>
+              <a:rPr lang="en-US" sz="2000" baseline="-25000" dirty="0" err="1">
+                <a:latin typeface="Times New Roman" panose="02020603050405020304" pitchFamily="18" charset="0"/>
+                <a:cs typeface="Times New Roman" panose="02020603050405020304" pitchFamily="18" charset="0"/>
+              </a:rPr>
+              <a:t>out,ss</a:t>
+            </a:r>
+            <a:r>
+              <a:rPr lang="en-US" sz="2000" dirty="0">
+                <a:latin typeface="Times New Roman" panose="02020603050405020304" pitchFamily="18" charset="0"/>
+                <a:cs typeface="Times New Roman" panose="02020603050405020304" pitchFamily="18" charset="0"/>
+              </a:rPr>
+              <a:t> (t) for the circuit below when v</a:t>
+            </a:r>
+            <a:r>
+              <a:rPr lang="en-US" sz="2000" baseline="-25000" dirty="0">
+                <a:latin typeface="Times New Roman" panose="02020603050405020304" pitchFamily="18" charset="0"/>
+                <a:cs typeface="Times New Roman" panose="02020603050405020304" pitchFamily="18" charset="0"/>
+              </a:rPr>
+              <a:t>in</a:t>
+            </a:r>
+            <a:r>
+              <a:rPr lang="en-US" sz="2000" dirty="0">
+                <a:latin typeface="Times New Roman" panose="02020603050405020304" pitchFamily="18" charset="0"/>
+                <a:cs typeface="Times New Roman" panose="02020603050405020304" pitchFamily="18" charset="0"/>
+              </a:rPr>
+              <a:t>(t) = K cos(</a:t>
+            </a:r>
+            <a:r>
+              <a:rPr lang="en-US" sz="2000" dirty="0" err="1">
+                <a:latin typeface="Times New Roman" panose="02020603050405020304" pitchFamily="18" charset="0"/>
+                <a:cs typeface="Times New Roman" panose="02020603050405020304" pitchFamily="18" charset="0"/>
+              </a:rPr>
+              <a:t>ωt</a:t>
+            </a:r>
+            <a:r>
+              <a:rPr lang="en-US" sz="2000" dirty="0">
+                <a:latin typeface="Times New Roman" panose="02020603050405020304" pitchFamily="18" charset="0"/>
+                <a:cs typeface="Times New Roman" panose="02020603050405020304" pitchFamily="18" charset="0"/>
+              </a:rPr>
+              <a:t>) V, K &gt; 0. All passive RLC circuits are stable since there are no active/dependent sources.</a:t>
+            </a:r>
+          </a:p>
+        </p:txBody>
+      </p:sp>
+      <p:sp>
+        <p:nvSpPr>
+          <p:cNvPr id="46" name="Rectangle 45"/>
+          <p:cNvSpPr/>
+          <p:nvPr/>
+        </p:nvSpPr>
+        <p:spPr>
+          <a:xfrm>
+            <a:off x="530942" y="2188168"/>
+            <a:ext cx="2111091" cy="400110"/>
+          </a:xfrm>
+          <a:prstGeom prst="rect">
+            <a:avLst/>
+          </a:prstGeom>
+        </p:spPr>
+        <p:txBody>
+          <a:bodyPr wrap="none">
+            <a:spAutoFit/>
+          </a:bodyPr>
+          <a:lstStyle/>
+          <a:p>
+            <a:r>
+              <a:rPr lang="en-US" sz="2000" b="1" i="1" dirty="0">
+                <a:solidFill>
+                  <a:schemeClr val="accent5">
+                    <a:lumMod val="75000"/>
+                  </a:schemeClr>
+                </a:solidFill>
+                <a:latin typeface="Times New Roman" panose="02020603050405020304" pitchFamily="18" charset="0"/>
+                <a:cs typeface="Times New Roman" panose="02020603050405020304" pitchFamily="18" charset="0"/>
+              </a:rPr>
+              <a:t>Step 1. Find H(s) </a:t>
+            </a:r>
+          </a:p>
+        </p:txBody>
+      </p:sp>
+      <p:sp>
+        <p:nvSpPr>
+          <p:cNvPr id="37" name="Rectangle 36"/>
+          <p:cNvSpPr/>
+          <p:nvPr/>
+        </p:nvSpPr>
+        <p:spPr>
+          <a:xfrm>
+            <a:off x="530942" y="4058164"/>
+            <a:ext cx="2419701" cy="400110"/>
+          </a:xfrm>
+          <a:prstGeom prst="rect">
+            <a:avLst/>
+          </a:prstGeom>
+        </p:spPr>
+        <p:txBody>
+          <a:bodyPr wrap="none">
+            <a:spAutoFit/>
+          </a:bodyPr>
+          <a:lstStyle/>
+          <a:p>
+            <a:r>
+              <a:rPr lang="en-US" sz="2000" b="1" i="1" dirty="0">
+                <a:solidFill>
+                  <a:schemeClr val="accent5">
+                    <a:lumMod val="75000"/>
+                  </a:schemeClr>
+                </a:solidFill>
+                <a:latin typeface="Times New Roman" panose="02020603050405020304" pitchFamily="18" charset="0"/>
+                <a:cs typeface="Times New Roman" panose="02020603050405020304" pitchFamily="18" charset="0"/>
+              </a:rPr>
+              <a:t>Step 2. Find </a:t>
+            </a:r>
+            <a:r>
+              <a:rPr lang="en-US" sz="2000" b="1" i="1" dirty="0" err="1">
+                <a:solidFill>
+                  <a:schemeClr val="accent5">
+                    <a:lumMod val="75000"/>
+                  </a:schemeClr>
+                </a:solidFill>
+                <a:latin typeface="Times New Roman" panose="02020603050405020304" pitchFamily="18" charset="0"/>
+                <a:cs typeface="Times New Roman" panose="02020603050405020304" pitchFamily="18" charset="0"/>
+              </a:rPr>
+              <a:t>V</a:t>
+            </a:r>
+            <a:r>
+              <a:rPr lang="en-US" sz="2000" b="1" i="1" baseline="-25000" dirty="0" err="1">
+                <a:solidFill>
+                  <a:schemeClr val="accent5">
+                    <a:lumMod val="75000"/>
+                  </a:schemeClr>
+                </a:solidFill>
+                <a:latin typeface="Times New Roman" panose="02020603050405020304" pitchFamily="18" charset="0"/>
+                <a:cs typeface="Times New Roman" panose="02020603050405020304" pitchFamily="18" charset="0"/>
+              </a:rPr>
+              <a:t>out,ss</a:t>
+            </a:r>
+            <a:r>
+              <a:rPr lang="en-US" sz="2000" b="1" i="1" dirty="0">
+                <a:solidFill>
+                  <a:schemeClr val="accent5">
+                    <a:lumMod val="75000"/>
+                  </a:schemeClr>
+                </a:solidFill>
+                <a:latin typeface="Times New Roman" panose="02020603050405020304" pitchFamily="18" charset="0"/>
+                <a:cs typeface="Times New Roman" panose="02020603050405020304" pitchFamily="18" charset="0"/>
+              </a:rPr>
+              <a:t>(s) </a:t>
+            </a:r>
+          </a:p>
+        </p:txBody>
+      </p:sp>
+      <mc:AlternateContent xmlns:mc="http://schemas.openxmlformats.org/markup-compatibility/2006" xmlns:a14="http://schemas.microsoft.com/office/drawing/2010/main">
+        <mc:Choice Requires="a14">
+          <p:sp>
+            <p:nvSpPr>
+              <p:cNvPr id="14" name="Rectangle 13"/>
+              <p:cNvSpPr/>
+              <p:nvPr/>
+            </p:nvSpPr>
+            <p:spPr>
+              <a:xfrm>
+                <a:off x="2451225" y="4603208"/>
+                <a:ext cx="3981859" cy="445699"/>
+              </a:xfrm>
+              <a:prstGeom prst="rect">
+                <a:avLst/>
+              </a:prstGeom>
+            </p:spPr>
+            <p:txBody>
+              <a:bodyPr wrap="none">
+                <a:spAutoFit/>
+              </a:bodyPr>
+              <a:lstStyle/>
+              <a:p>
+                <a:pPr/>
+                <a14:m>
+                  <m:oMathPara xmlns:m="http://schemas.openxmlformats.org/officeDocument/2006/math">
+                    <m:oMathParaPr>
+                      <m:jc m:val="centerGroup"/>
+                    </m:oMathParaPr>
+                    <m:oMath xmlns:m="http://schemas.openxmlformats.org/officeDocument/2006/math">
+                      <m:sSub>
+                        <m:sSubPr>
+                          <m:ctrlPr>
+                            <a:rPr lang="en-US" sz="2200" b="1" i="1" smtClean="0">
+                              <a:latin typeface="Cambria Math"/>
+                            </a:rPr>
+                          </m:ctrlPr>
+                        </m:sSubPr>
+                        <m:e>
+                          <m:r>
+                            <a:rPr lang="en-US" sz="2200" b="1" i="1" smtClean="0">
+                              <a:latin typeface="Cambria Math" panose="02040503050406030204" pitchFamily="18" charset="0"/>
+                            </a:rPr>
+                            <m:t>𝑽</m:t>
+                          </m:r>
+                        </m:e>
+                        <m:sub>
+                          <m:r>
+                            <a:rPr lang="en-US" sz="2200" b="1" i="1" smtClean="0">
+                              <a:latin typeface="Cambria Math" panose="02040503050406030204" pitchFamily="18" charset="0"/>
+                            </a:rPr>
+                            <m:t>𝒐𝒖𝒕</m:t>
+                          </m:r>
+                          <m:r>
+                            <a:rPr lang="en-US" sz="2200" b="1" i="1" smtClean="0">
+                              <a:latin typeface="Cambria Math" panose="02040503050406030204" pitchFamily="18" charset="0"/>
+                            </a:rPr>
+                            <m:t>, </m:t>
+                          </m:r>
+                          <m:r>
+                            <a:rPr lang="en-US" sz="2200" b="1" i="1" smtClean="0">
+                              <a:latin typeface="Cambria Math" panose="02040503050406030204" pitchFamily="18" charset="0"/>
+                            </a:rPr>
+                            <m:t>𝒔𝒔</m:t>
+                          </m:r>
+                        </m:sub>
+                      </m:sSub>
+                      <m:d>
+                        <m:dPr>
+                          <m:ctrlPr>
+                            <a:rPr lang="en-US" sz="2200" b="1" i="1" smtClean="0">
+                              <a:latin typeface="Cambria Math"/>
+                            </a:rPr>
+                          </m:ctrlPr>
+                        </m:dPr>
+                        <m:e>
+                          <m:r>
+                            <a:rPr lang="en-US" sz="2200" b="1" i="1" smtClean="0">
+                              <a:latin typeface="Cambria Math" panose="02040503050406030204" pitchFamily="18" charset="0"/>
+                            </a:rPr>
+                            <m:t>𝒋𝒘</m:t>
+                          </m:r>
+                        </m:e>
+                      </m:d>
+                      <m:r>
+                        <a:rPr lang="en-US" sz="2200" b="1" i="1" smtClean="0">
+                          <a:latin typeface="Cambria Math" panose="02040503050406030204" pitchFamily="18" charset="0"/>
+                        </a:rPr>
+                        <m:t>=</m:t>
+                      </m:r>
+                      <m:r>
+                        <a:rPr lang="en-US" sz="2200" b="1" i="1" smtClean="0">
+                          <a:latin typeface="Cambria Math" panose="02040503050406030204" pitchFamily="18" charset="0"/>
+                        </a:rPr>
+                        <m:t>𝑯</m:t>
+                      </m:r>
+                      <m:d>
+                        <m:dPr>
+                          <m:ctrlPr>
+                            <a:rPr lang="en-US" sz="2200" b="1" i="1" smtClean="0">
+                              <a:latin typeface="Cambria Math"/>
+                            </a:rPr>
+                          </m:ctrlPr>
+                        </m:dPr>
+                        <m:e>
+                          <m:r>
+                            <a:rPr lang="en-US" sz="2200" b="1" i="1" smtClean="0">
+                              <a:latin typeface="Cambria Math" panose="02040503050406030204" pitchFamily="18" charset="0"/>
+                            </a:rPr>
+                            <m:t>𝒋𝒘</m:t>
+                          </m:r>
+                        </m:e>
+                      </m:d>
+                      <m:r>
+                        <a:rPr lang="en-US" sz="2200" b="1" i="1" smtClean="0">
+                          <a:latin typeface="Cambria Math" panose="02040503050406030204" pitchFamily="18" charset="0"/>
+                        </a:rPr>
+                        <m:t>∗</m:t>
+                      </m:r>
+                      <m:sSub>
+                        <m:sSubPr>
+                          <m:ctrlPr>
+                            <a:rPr lang="en-US" sz="2200" b="1" i="1" smtClean="0">
+                              <a:latin typeface="Cambria Math"/>
+                            </a:rPr>
+                          </m:ctrlPr>
+                        </m:sSubPr>
+                        <m:e>
+                          <m:r>
+                            <a:rPr lang="en-US" sz="2200" b="1" i="1" smtClean="0">
+                              <a:latin typeface="Cambria Math" panose="02040503050406030204" pitchFamily="18" charset="0"/>
+                            </a:rPr>
+                            <m:t>𝑽</m:t>
+                          </m:r>
+                        </m:e>
+                        <m:sub>
+                          <m:r>
+                            <a:rPr lang="en-US" sz="2200" b="1" i="1" smtClean="0">
+                              <a:latin typeface="Cambria Math" panose="02040503050406030204" pitchFamily="18" charset="0"/>
+                            </a:rPr>
+                            <m:t>𝒊𝒏</m:t>
+                          </m:r>
+                        </m:sub>
+                      </m:sSub>
+                      <m:r>
+                        <a:rPr lang="en-US" sz="2200" b="1" i="1" smtClean="0">
+                          <a:latin typeface="Cambria Math" panose="02040503050406030204" pitchFamily="18" charset="0"/>
+                        </a:rPr>
+                        <m:t>(</m:t>
+                      </m:r>
+                      <m:r>
+                        <a:rPr lang="en-US" sz="2200" b="1" i="1" smtClean="0">
+                          <a:latin typeface="Cambria Math" panose="02040503050406030204" pitchFamily="18" charset="0"/>
+                        </a:rPr>
+                        <m:t>𝒋𝒘</m:t>
+                      </m:r>
+                      <m:r>
+                        <a:rPr lang="en-US" sz="2200" b="1" i="1" smtClean="0">
+                          <a:latin typeface="Cambria Math" panose="02040503050406030204" pitchFamily="18" charset="0"/>
+                        </a:rPr>
+                        <m:t>)</m:t>
+                      </m:r>
+                    </m:oMath>
+                  </m:oMathPara>
+                </a14:m>
+                <a:endParaRPr lang="en-US" sz="2200" b="1" dirty="0">
+                  <a:latin typeface="Times New Roman" panose="02020603050405020304" pitchFamily="18" charset="0"/>
+                  <a:cs typeface="Times New Roman" panose="02020603050405020304" pitchFamily="18" charset="0"/>
+                </a:endParaRPr>
+              </a:p>
+            </p:txBody>
+          </p:sp>
+        </mc:Choice>
+        <mc:Fallback xmlns="">
+          <p:sp>
+            <p:nvSpPr>
+              <p:cNvPr id="14" name="Rectangle 13"/>
+              <p:cNvSpPr>
+                <a:spLocks noRot="1" noChangeAspect="1" noMove="1" noResize="1" noEditPoints="1" noAdjustHandles="1" noChangeArrowheads="1" noChangeShapeType="1" noTextEdit="1"/>
+              </p:cNvSpPr>
+              <p:nvPr/>
+            </p:nvSpPr>
+            <p:spPr>
+              <a:xfrm>
+                <a:off x="2451225" y="4603208"/>
+                <a:ext cx="3981859" cy="445699"/>
+              </a:xfrm>
+              <a:prstGeom prst="rect">
+                <a:avLst/>
+              </a:prstGeom>
+              <a:blipFill>
+                <a:blip r:embed="rId3"/>
+                <a:stretch>
+                  <a:fillRect b="-13699"/>
+                </a:stretch>
+              </a:blipFill>
+            </p:spPr>
+            <p:txBody>
+              <a:bodyPr/>
+              <a:lstStyle/>
+              <a:p>
+                <a:r>
+                  <a:rPr lang="en-GB">
+                    <a:noFill/>
+                  </a:rPr>
+                  <a:t> </a:t>
+                </a:r>
+              </a:p>
+            </p:txBody>
+          </p:sp>
+        </mc:Fallback>
+      </mc:AlternateContent>
+      <mc:AlternateContent xmlns:mc="http://schemas.openxmlformats.org/markup-compatibility/2006" xmlns:a14="http://schemas.microsoft.com/office/drawing/2010/main">
+        <mc:Choice Requires="a14">
+          <p:sp>
+            <p:nvSpPr>
+              <p:cNvPr id="49" name="Rectangle 48"/>
+              <p:cNvSpPr/>
+              <p:nvPr/>
+            </p:nvSpPr>
+            <p:spPr>
+              <a:xfrm>
+                <a:off x="2033943" y="5311725"/>
+                <a:ext cx="4545283" cy="788486"/>
+              </a:xfrm>
+              <a:prstGeom prst="rect">
+                <a:avLst/>
+              </a:prstGeom>
+            </p:spPr>
+            <p:txBody>
+              <a:bodyPr wrap="none">
+                <a:spAutoFit/>
+              </a:bodyPr>
+              <a:lstStyle/>
+              <a:p>
+                <a:pPr/>
+                <a14:m>
+                  <m:oMathPara xmlns:m="http://schemas.openxmlformats.org/officeDocument/2006/math">
+                    <m:oMathParaPr>
+                      <m:jc m:val="centerGroup"/>
+                    </m:oMathParaPr>
+                    <m:oMath xmlns:m="http://schemas.openxmlformats.org/officeDocument/2006/math">
+                      <m:sSub>
+                        <m:sSubPr>
+                          <m:ctrlPr>
+                            <a:rPr lang="en-US" sz="2200" b="1" i="1" smtClean="0">
+                              <a:latin typeface="Cambria Math"/>
+                            </a:rPr>
+                          </m:ctrlPr>
+                        </m:sSubPr>
+                        <m:e>
+                          <m:r>
+                            <a:rPr lang="en-US" sz="2200" b="1" i="1" smtClean="0">
+                              <a:latin typeface="Cambria Math" panose="02040503050406030204" pitchFamily="18" charset="0"/>
+                            </a:rPr>
+                            <m:t>𝑽</m:t>
+                          </m:r>
+                        </m:e>
+                        <m:sub>
+                          <m:r>
+                            <a:rPr lang="en-US" sz="2200" b="1" i="1" smtClean="0">
+                              <a:latin typeface="Cambria Math" panose="02040503050406030204" pitchFamily="18" charset="0"/>
+                            </a:rPr>
+                            <m:t>𝒐𝒖𝒕</m:t>
+                          </m:r>
+                          <m:r>
+                            <a:rPr lang="en-US" sz="2200" b="1" i="1" smtClean="0">
+                              <a:latin typeface="Cambria Math" panose="02040503050406030204" pitchFamily="18" charset="0"/>
+                            </a:rPr>
+                            <m:t>, </m:t>
+                          </m:r>
+                          <m:r>
+                            <a:rPr lang="en-US" sz="2200" b="1" i="1" smtClean="0">
+                              <a:latin typeface="Cambria Math" panose="02040503050406030204" pitchFamily="18" charset="0"/>
+                            </a:rPr>
+                            <m:t>𝒔𝒔</m:t>
+                          </m:r>
+                        </m:sub>
+                      </m:sSub>
+                      <m:d>
+                        <m:dPr>
+                          <m:ctrlPr>
+                            <a:rPr lang="en-US" sz="2200" b="1" i="1" smtClean="0">
+                              <a:latin typeface="Cambria Math"/>
+                            </a:rPr>
+                          </m:ctrlPr>
+                        </m:dPr>
+                        <m:e>
+                          <m:r>
+                            <a:rPr lang="en-US" sz="2200" b="1" i="1" smtClean="0">
+                              <a:latin typeface="Cambria Math" panose="02040503050406030204" pitchFamily="18" charset="0"/>
+                            </a:rPr>
+                            <m:t>𝒋𝒘</m:t>
+                          </m:r>
+                        </m:e>
+                      </m:d>
+                      <m:r>
+                        <a:rPr lang="en-US" sz="2200" b="1" i="1" smtClean="0">
+                          <a:latin typeface="Cambria Math" panose="02040503050406030204" pitchFamily="18" charset="0"/>
+                        </a:rPr>
+                        <m:t>=</m:t>
+                      </m:r>
+                      <m:f>
+                        <m:fPr>
+                          <m:ctrlPr>
+                            <a:rPr lang="en-US" sz="2200" b="1" i="1" smtClean="0">
+                              <a:latin typeface="Cambria Math"/>
+                            </a:rPr>
+                          </m:ctrlPr>
+                        </m:fPr>
+                        <m:num>
+                          <m:r>
+                            <a:rPr lang="en-US" sz="2200" b="1" i="1" smtClean="0">
+                              <a:latin typeface="Cambria Math" panose="02040503050406030204" pitchFamily="18" charset="0"/>
+                            </a:rPr>
+                            <m:t>𝟏</m:t>
+                          </m:r>
+                        </m:num>
+                        <m:den>
+                          <m:r>
+                            <a:rPr lang="en-US" sz="2200" b="1" i="1" smtClean="0">
+                              <a:latin typeface="Cambria Math" panose="02040503050406030204" pitchFamily="18" charset="0"/>
+                            </a:rPr>
+                            <m:t>(</m:t>
+                          </m:r>
+                          <m:r>
+                            <a:rPr lang="en-US" sz="2200" b="1" i="1" smtClean="0">
+                              <a:latin typeface="Cambria Math" panose="02040503050406030204" pitchFamily="18" charset="0"/>
+                            </a:rPr>
+                            <m:t>𝒋𝒘</m:t>
+                          </m:r>
+                          <m:sSup>
+                            <m:sSupPr>
+                              <m:ctrlPr>
+                                <a:rPr lang="en-US" sz="2200" b="1" i="1" smtClean="0">
+                                  <a:latin typeface="Cambria Math"/>
+                                </a:rPr>
+                              </m:ctrlPr>
+                            </m:sSupPr>
+                            <m:e>
+                              <m:r>
+                                <a:rPr lang="en-US" sz="2200" b="1" i="1" smtClean="0">
+                                  <a:latin typeface="Cambria Math" panose="02040503050406030204" pitchFamily="18" charset="0"/>
+                                </a:rPr>
+                                <m:t>)</m:t>
+                              </m:r>
+                            </m:e>
+                            <m:sup>
+                              <m:r>
+                                <a:rPr lang="en-US" sz="2200" b="1" i="1" smtClean="0">
+                                  <a:latin typeface="Cambria Math" panose="02040503050406030204" pitchFamily="18" charset="0"/>
+                                </a:rPr>
+                                <m:t>𝟐</m:t>
+                              </m:r>
+                            </m:sup>
+                          </m:sSup>
+                          <m:r>
+                            <a:rPr lang="en-US" sz="2200" b="1" i="1" smtClean="0">
+                              <a:latin typeface="Cambria Math" panose="02040503050406030204" pitchFamily="18" charset="0"/>
+                            </a:rPr>
+                            <m:t>+</m:t>
+                          </m:r>
+                          <m:d>
+                            <m:dPr>
+                              <m:ctrlPr>
+                                <a:rPr lang="en-US" sz="2200" b="1" i="1" smtClean="0">
+                                  <a:latin typeface="Cambria Math"/>
+                                </a:rPr>
+                              </m:ctrlPr>
+                            </m:dPr>
+                            <m:e>
+                              <m:r>
+                                <a:rPr lang="en-US" sz="2200" b="1" i="1" smtClean="0">
+                                  <a:latin typeface="Cambria Math" panose="02040503050406030204" pitchFamily="18" charset="0"/>
+                                </a:rPr>
+                                <m:t>𝒋𝒘</m:t>
+                              </m:r>
+                            </m:e>
+                          </m:d>
+                          <m:r>
+                            <a:rPr lang="en-US" sz="2200" b="1" i="1" smtClean="0">
+                              <a:latin typeface="Cambria Math" panose="02040503050406030204" pitchFamily="18" charset="0"/>
+                            </a:rPr>
+                            <m:t>+</m:t>
+                          </m:r>
+                          <m:r>
+                            <a:rPr lang="en-US" sz="2200" b="1" i="1" smtClean="0">
+                              <a:latin typeface="Cambria Math" panose="02040503050406030204" pitchFamily="18" charset="0"/>
+                            </a:rPr>
+                            <m:t>𝟏</m:t>
+                          </m:r>
+                        </m:den>
+                      </m:f>
+                      <m:r>
+                        <a:rPr lang="en-US" sz="2200" b="1" i="1" smtClean="0">
+                          <a:latin typeface="Cambria Math" panose="02040503050406030204" pitchFamily="18" charset="0"/>
+                        </a:rPr>
+                        <m:t>∗</m:t>
+                      </m:r>
+                      <m:r>
+                        <a:rPr lang="en-US" sz="2200" b="1" i="1" smtClean="0">
+                          <a:latin typeface="Cambria Math" panose="02040503050406030204" pitchFamily="18" charset="0"/>
+                        </a:rPr>
+                        <m:t>𝑲</m:t>
+                      </m:r>
+                    </m:oMath>
+                  </m:oMathPara>
+                </a14:m>
+                <a:endParaRPr lang="en-US" sz="2200" b="1" dirty="0">
+                  <a:latin typeface="Times New Roman" panose="02020603050405020304" pitchFamily="18" charset="0"/>
+                  <a:cs typeface="Times New Roman" panose="02020603050405020304" pitchFamily="18" charset="0"/>
+                </a:endParaRPr>
+              </a:p>
+            </p:txBody>
+          </p:sp>
+        </mc:Choice>
+        <mc:Fallback xmlns="">
+          <p:sp>
+            <p:nvSpPr>
+              <p:cNvPr id="49" name="Rectangle 48"/>
+              <p:cNvSpPr>
+                <a:spLocks noRot="1" noChangeAspect="1" noMove="1" noResize="1" noEditPoints="1" noAdjustHandles="1" noChangeArrowheads="1" noChangeShapeType="1" noTextEdit="1"/>
+              </p:cNvSpPr>
+              <p:nvPr/>
+            </p:nvSpPr>
+            <p:spPr>
+              <a:xfrm>
+                <a:off x="2033943" y="5311725"/>
+                <a:ext cx="4545283" cy="788486"/>
+              </a:xfrm>
+              <a:prstGeom prst="rect">
+                <a:avLst/>
+              </a:prstGeom>
+              <a:blipFill>
+                <a:blip r:embed="rId4"/>
+                <a:stretch>
+                  <a:fillRect/>
+                </a:stretch>
+              </a:blipFill>
+            </p:spPr>
+            <p:txBody>
+              <a:bodyPr/>
+              <a:lstStyle/>
+              <a:p>
+                <a:r>
+                  <a:rPr lang="en-GB">
+                    <a:noFill/>
+                  </a:rPr>
+                  <a:t> </a:t>
+                </a:r>
+              </a:p>
+            </p:txBody>
+          </p:sp>
+        </mc:Fallback>
+      </mc:AlternateContent>
+      <p:grpSp>
+        <p:nvGrpSpPr>
+          <p:cNvPr id="50" name="Group 49"/>
+          <p:cNvGrpSpPr/>
+          <p:nvPr/>
+        </p:nvGrpSpPr>
+        <p:grpSpPr>
+          <a:xfrm>
+            <a:off x="6516808" y="5553568"/>
+            <a:ext cx="381000" cy="304800"/>
+            <a:chOff x="9126306" y="1714002"/>
+            <a:chExt cx="381000" cy="304800"/>
+          </a:xfrm>
+        </p:grpSpPr>
+        <p:sp>
+          <p:nvSpPr>
+            <p:cNvPr id="51" name="Line 10"/>
+            <p:cNvSpPr>
+              <a:spLocks noChangeShapeType="1"/>
+            </p:cNvSpPr>
+            <p:nvPr/>
+          </p:nvSpPr>
+          <p:spPr bwMode="auto">
+            <a:xfrm>
+              <a:off x="9126306" y="1714002"/>
+              <a:ext cx="0" cy="304800"/>
+            </a:xfrm>
+            <a:prstGeom prst="line">
+              <a:avLst/>
+            </a:prstGeom>
+            <a:noFill/>
+            <a:ln w="25400">
+              <a:solidFill>
+                <a:schemeClr val="tx1"/>
+              </a:solidFill>
+              <a:round/>
+              <a:headEnd/>
+              <a:tailEnd/>
+            </a:ln>
+            <a:extLst>
+              <a:ext uri="{909E8E84-426E-40DD-AFC4-6F175D3DCCD1}">
+                <a14:hiddenFill xmlns:a14="http://schemas.microsoft.com/office/drawing/2010/main">
+                  <a:noFill/>
+                </a14:hiddenFill>
+              </a:ext>
+            </a:extLst>
+          </p:spPr>
+          <p:txBody>
+            <a:bodyPr/>
+            <a:lstStyle/>
+            <a:p>
+              <a:endParaRPr lang="en-US">
+                <a:latin typeface="Times New Roman" panose="02020603050405020304" pitchFamily="18" charset="0"/>
+                <a:cs typeface="Times New Roman" panose="02020603050405020304" pitchFamily="18" charset="0"/>
+              </a:endParaRPr>
+            </a:p>
+          </p:txBody>
+        </p:sp>
+        <p:sp>
+          <p:nvSpPr>
+            <p:cNvPr id="52" name="Line 11"/>
+            <p:cNvSpPr>
+              <a:spLocks noChangeShapeType="1"/>
+            </p:cNvSpPr>
+            <p:nvPr/>
+          </p:nvSpPr>
+          <p:spPr bwMode="auto">
+            <a:xfrm>
+              <a:off x="9126306" y="2018802"/>
+              <a:ext cx="381000" cy="0"/>
+            </a:xfrm>
+            <a:prstGeom prst="line">
+              <a:avLst/>
+            </a:prstGeom>
+            <a:noFill/>
+            <a:ln w="25400">
+              <a:solidFill>
+                <a:schemeClr val="tx1"/>
+              </a:solidFill>
+              <a:round/>
+              <a:headEnd/>
+              <a:tailEnd/>
+            </a:ln>
+            <a:extLst>
+              <a:ext uri="{909E8E84-426E-40DD-AFC4-6F175D3DCCD1}">
+                <a14:hiddenFill xmlns:a14="http://schemas.microsoft.com/office/drawing/2010/main">
+                  <a:noFill/>
+                </a14:hiddenFill>
+              </a:ext>
+            </a:extLst>
+          </p:spPr>
+          <p:txBody>
+            <a:bodyPr/>
+            <a:lstStyle/>
+            <a:p>
+              <a:endParaRPr lang="en-US">
+                <a:latin typeface="Times New Roman" panose="02020603050405020304" pitchFamily="18" charset="0"/>
+                <a:cs typeface="Times New Roman" panose="02020603050405020304" pitchFamily="18" charset="0"/>
+              </a:endParaRPr>
+            </a:p>
+          </p:txBody>
+        </p:sp>
+      </p:grpSp>
+      <mc:AlternateContent xmlns:mc="http://schemas.openxmlformats.org/markup-compatibility/2006" xmlns:a14="http://schemas.microsoft.com/office/drawing/2010/main">
+        <mc:Choice Requires="a14">
+          <p:sp>
+            <p:nvSpPr>
+              <p:cNvPr id="15" name="TextBox 14"/>
+              <p:cNvSpPr txBox="1"/>
+              <p:nvPr/>
+            </p:nvSpPr>
+            <p:spPr>
+              <a:xfrm>
+                <a:off x="6455744" y="5535984"/>
+                <a:ext cx="583131" cy="369332"/>
+              </a:xfrm>
+              <a:prstGeom prst="rect">
+                <a:avLst/>
+              </a:prstGeom>
+              <a:noFill/>
+            </p:spPr>
+            <p:txBody>
+              <a:bodyPr wrap="square" rtlCol="0">
+                <a:spAutoFit/>
+              </a:bodyPr>
+              <a:lstStyle/>
+              <a:p>
+                <a:pPr/>
+                <a14:m>
+                  <m:oMathPara xmlns:m="http://schemas.openxmlformats.org/officeDocument/2006/math">
+                    <m:oMathParaPr>
+                      <m:jc m:val="centerGroup"/>
+                    </m:oMathParaPr>
+                    <m:oMath xmlns:m="http://schemas.openxmlformats.org/officeDocument/2006/math">
+                      <m:sSup>
+                        <m:sSupPr>
+                          <m:ctrlPr>
+                            <a:rPr lang="en-US" b="1" i="1" dirty="0" smtClean="0">
+                              <a:latin typeface="Cambria Math"/>
+                            </a:rPr>
+                          </m:ctrlPr>
+                        </m:sSupPr>
+                        <m:e>
+                          <m:r>
+                            <a:rPr lang="en-US" b="1" i="1" dirty="0" smtClean="0">
+                              <a:latin typeface="Cambria Math" panose="02040503050406030204" pitchFamily="18" charset="0"/>
+                            </a:rPr>
+                            <m:t>𝟎</m:t>
+                          </m:r>
+                        </m:e>
+                        <m:sup>
+                          <m:r>
+                            <a:rPr lang="en-US" b="1" i="1" dirty="0" smtClean="0">
+                              <a:latin typeface="Cambria Math" panose="02040503050406030204" pitchFamily="18" charset="0"/>
+                            </a:rPr>
+                            <m:t>𝒐</m:t>
+                          </m:r>
+                        </m:sup>
+                      </m:sSup>
+                    </m:oMath>
+                  </m:oMathPara>
+                </a14:m>
+                <a:endParaRPr lang="en-US" b="1" dirty="0">
+                  <a:latin typeface="Times New Roman" panose="02020603050405020304" pitchFamily="18" charset="0"/>
+                  <a:cs typeface="Times New Roman" panose="02020603050405020304" pitchFamily="18" charset="0"/>
+                </a:endParaRPr>
+              </a:p>
+            </p:txBody>
+          </p:sp>
+        </mc:Choice>
+        <mc:Fallback xmlns="">
+          <p:sp>
+            <p:nvSpPr>
+              <p:cNvPr id="15" name="TextBox 14"/>
+              <p:cNvSpPr txBox="1">
+                <a:spLocks noRot="1" noChangeAspect="1" noMove="1" noResize="1" noEditPoints="1" noAdjustHandles="1" noChangeArrowheads="1" noChangeShapeType="1" noTextEdit="1"/>
+              </p:cNvSpPr>
+              <p:nvPr/>
+            </p:nvSpPr>
+            <p:spPr>
+              <a:xfrm>
+                <a:off x="6455744" y="5535984"/>
+                <a:ext cx="583131" cy="369332"/>
+              </a:xfrm>
+              <a:prstGeom prst="rect">
+                <a:avLst/>
+              </a:prstGeom>
+              <a:blipFill>
+                <a:blip r:embed="rId5"/>
+                <a:stretch>
+                  <a:fillRect/>
+                </a:stretch>
+              </a:blipFill>
+            </p:spPr>
+            <p:txBody>
+              <a:bodyPr/>
+              <a:lstStyle/>
+              <a:p>
+                <a:r>
+                  <a:rPr lang="en-GB">
+                    <a:noFill/>
+                  </a:rPr>
+                  <a:t> </a:t>
+                </a:r>
+              </a:p>
+            </p:txBody>
+          </p:sp>
+        </mc:Fallback>
+      </mc:AlternateContent>
+      <mc:AlternateContent xmlns:mc="http://schemas.openxmlformats.org/markup-compatibility/2006">
+        <mc:Choice xmlns:a14="http://schemas.microsoft.com/office/drawing/2010/main" Requires="a14">
+          <p:sp>
+            <p:nvSpPr>
+              <p:cNvPr id="5" name="TextBox 4"/>
+              <p:cNvSpPr txBox="1"/>
+              <p:nvPr/>
+            </p:nvSpPr>
+            <p:spPr>
+              <a:xfrm>
+                <a:off x="1620667" y="2746505"/>
+                <a:ext cx="5135380" cy="1185068"/>
+              </a:xfrm>
+              <a:prstGeom prst="rect">
+                <a:avLst/>
+              </a:prstGeom>
+              <a:noFill/>
+            </p:spPr>
+            <p:txBody>
+              <a:bodyPr wrap="none" rtlCol="0">
+                <a:spAutoFit/>
+              </a:bodyPr>
+              <a:lstStyle/>
+              <a:p>
+                <a14:m>
+                  <m:oMath xmlns:m="http://schemas.openxmlformats.org/officeDocument/2006/math">
+                    <m:r>
+                      <a:rPr lang="en-US" sz="3200" b="0" i="1" smtClean="0">
+                        <a:latin typeface="Cambria Math"/>
+                      </a:rPr>
+                      <m:t>𝐻</m:t>
+                    </m:r>
+                    <m:d>
+                      <m:dPr>
+                        <m:ctrlPr>
+                          <a:rPr lang="en-US" sz="3200" b="0" i="1" smtClean="0">
+                            <a:latin typeface="Cambria Math"/>
+                          </a:rPr>
+                        </m:ctrlPr>
+                      </m:dPr>
+                      <m:e>
+                        <m:r>
+                          <a:rPr lang="en-US" sz="3200" b="0" i="1" smtClean="0">
+                            <a:latin typeface="Cambria Math"/>
+                          </a:rPr>
+                          <m:t>𝑠</m:t>
+                        </m:r>
+                      </m:e>
+                    </m:d>
+                    <m:r>
+                      <a:rPr lang="en-US" sz="3200" b="0" i="1" smtClean="0">
+                        <a:latin typeface="Cambria Math"/>
+                      </a:rPr>
+                      <m:t>= </m:t>
+                    </m:r>
+                    <m:f>
+                      <m:fPr>
+                        <m:ctrlPr>
+                          <a:rPr lang="en-US" sz="3200" b="0" i="1" smtClean="0">
+                            <a:latin typeface="Cambria Math"/>
+                          </a:rPr>
+                        </m:ctrlPr>
+                      </m:fPr>
+                      <m:num>
+                        <m:r>
+                          <a:rPr lang="en-US" sz="3200" b="0" i="1" smtClean="0">
+                            <a:latin typeface="Cambria Math"/>
+                          </a:rPr>
+                          <m:t>𝑉</m:t>
+                        </m:r>
+                        <m:r>
+                          <a:rPr lang="en-US" sz="3200" b="0" i="1" baseline="-25000" smtClean="0">
+                            <a:latin typeface="Cambria Math"/>
+                          </a:rPr>
+                          <m:t>𝑜𝑢𝑡</m:t>
+                        </m:r>
+                      </m:num>
+                      <m:den>
+                        <m:r>
+                          <a:rPr lang="en-US" sz="3200" b="0" i="1" smtClean="0">
+                            <a:latin typeface="Cambria Math"/>
+                          </a:rPr>
+                          <m:t>𝑉</m:t>
+                        </m:r>
+                        <m:r>
+                          <a:rPr lang="en-US" sz="3200" b="0" i="1" baseline="-25000" smtClean="0">
+                            <a:latin typeface="Cambria Math"/>
+                          </a:rPr>
+                          <m:t>𝑖𝑛</m:t>
+                        </m:r>
+                      </m:den>
+                    </m:f>
+                  </m:oMath>
+                </a14:m>
+                <a:r>
+                  <a:rPr lang="en-US" sz="3200" dirty="0" smtClean="0"/>
+                  <a:t> = </a:t>
+                </a:r>
+                <a14:m>
+                  <m:oMath xmlns:m="http://schemas.openxmlformats.org/officeDocument/2006/math">
+                    <m:f>
+                      <m:fPr>
+                        <m:ctrlPr>
+                          <a:rPr lang="en-US" sz="3200" i="1" smtClean="0">
+                            <a:latin typeface="Cambria Math"/>
+                          </a:rPr>
+                        </m:ctrlPr>
+                      </m:fPr>
+                      <m:num>
+                        <m:f>
+                          <m:fPr>
+                            <m:ctrlPr>
+                              <a:rPr lang="en-US" sz="3200" i="1" smtClean="0">
+                                <a:latin typeface="Cambria Math"/>
+                              </a:rPr>
+                            </m:ctrlPr>
+                          </m:fPr>
+                          <m:num>
+                            <m:r>
+                              <a:rPr lang="en-US" sz="3200" b="0" i="1" smtClean="0">
+                                <a:latin typeface="Cambria Math"/>
+                              </a:rPr>
+                              <m:t>1</m:t>
+                            </m:r>
+                          </m:num>
+                          <m:den>
+                            <m:r>
+                              <a:rPr lang="en-US" sz="3200" b="0" i="1" smtClean="0">
+                                <a:latin typeface="Cambria Math"/>
+                              </a:rPr>
+                              <m:t>𝑠</m:t>
+                            </m:r>
+                          </m:den>
+                        </m:f>
+                      </m:num>
+                      <m:den>
+                        <m:r>
+                          <a:rPr lang="en-US" sz="3200" b="0" i="1" smtClean="0">
+                            <a:latin typeface="Cambria Math"/>
+                          </a:rPr>
+                          <m:t>1+</m:t>
+                        </m:r>
+                        <m:r>
+                          <a:rPr lang="en-US" sz="3200" b="0" i="1" smtClean="0">
+                            <a:latin typeface="Cambria Math"/>
+                          </a:rPr>
+                          <m:t>𝑠</m:t>
+                        </m:r>
+                        <m:r>
+                          <a:rPr lang="en-US" sz="3200" b="0" i="1" smtClean="0">
+                            <a:latin typeface="Cambria Math"/>
+                          </a:rPr>
+                          <m:t>+</m:t>
+                        </m:r>
+                        <m:f>
+                          <m:fPr>
+                            <m:ctrlPr>
+                              <a:rPr lang="en-US" sz="3200" b="0" i="1" smtClean="0">
+                                <a:latin typeface="Cambria Math"/>
+                              </a:rPr>
+                            </m:ctrlPr>
+                          </m:fPr>
+                          <m:num>
+                            <m:r>
+                              <a:rPr lang="en-US" sz="3200" b="0" i="1" smtClean="0">
+                                <a:latin typeface="Cambria Math"/>
+                              </a:rPr>
+                              <m:t>1</m:t>
+                            </m:r>
+                          </m:num>
+                          <m:den>
+                            <m:r>
+                              <a:rPr lang="en-US" sz="3200" b="0" i="1" smtClean="0">
+                                <a:latin typeface="Cambria Math"/>
+                              </a:rPr>
+                              <m:t>𝑠</m:t>
+                            </m:r>
+                          </m:den>
+                        </m:f>
+                      </m:den>
+                    </m:f>
+                    <m:r>
+                      <a:rPr lang="en-US" sz="3200" b="0" i="1" smtClean="0">
+                        <a:latin typeface="Cambria Math"/>
+                      </a:rPr>
+                      <m:t>= </m:t>
+                    </m:r>
+                    <m:f>
+                      <m:fPr>
+                        <m:ctrlPr>
+                          <a:rPr lang="en-US" sz="3200" b="0" i="1" smtClean="0">
+                            <a:latin typeface="Cambria Math"/>
+                          </a:rPr>
+                        </m:ctrlPr>
+                      </m:fPr>
+                      <m:num>
+                        <m:r>
+                          <a:rPr lang="en-US" sz="3200" b="0" i="1" smtClean="0">
+                            <a:latin typeface="Cambria Math"/>
+                          </a:rPr>
+                          <m:t>1</m:t>
+                        </m:r>
+                      </m:num>
+                      <m:den>
+                        <m:r>
+                          <a:rPr lang="en-US" sz="3200" b="0" i="1" smtClean="0">
+                            <a:latin typeface="Cambria Math"/>
+                          </a:rPr>
+                          <m:t>𝑠</m:t>
+                        </m:r>
+                        <m:r>
+                          <a:rPr lang="en-US" sz="3200" b="0" i="1" baseline="30000" smtClean="0">
+                            <a:latin typeface="Cambria Math"/>
+                          </a:rPr>
+                          <m:t>2</m:t>
+                        </m:r>
+                        <m:r>
+                          <a:rPr lang="en-US" sz="3200" b="0" i="1" smtClean="0">
+                            <a:latin typeface="Cambria Math"/>
+                          </a:rPr>
+                          <m:t>+</m:t>
+                        </m:r>
+                        <m:r>
+                          <a:rPr lang="en-US" sz="3200" b="0" i="1" smtClean="0">
+                            <a:latin typeface="Cambria Math"/>
+                          </a:rPr>
+                          <m:t>𝑠</m:t>
+                        </m:r>
+                        <m:r>
+                          <a:rPr lang="en-US" sz="3200" b="0" i="1" smtClean="0">
+                            <a:latin typeface="Cambria Math"/>
+                          </a:rPr>
+                          <m:t>+1</m:t>
+                        </m:r>
+                      </m:den>
+                    </m:f>
+                  </m:oMath>
+                </a14:m>
+                <a:endParaRPr lang="en-US" sz="3200" dirty="0"/>
+              </a:p>
+            </p:txBody>
+          </p:sp>
+        </mc:Choice>
+        <mc:Fallback>
+          <p:sp>
+            <p:nvSpPr>
+              <p:cNvPr id="5" name="TextBox 4"/>
+              <p:cNvSpPr txBox="1">
+                <a:spLocks noRot="1" noChangeAspect="1" noMove="1" noResize="1" noEditPoints="1" noAdjustHandles="1" noChangeArrowheads="1" noChangeShapeType="1" noTextEdit="1"/>
+              </p:cNvSpPr>
+              <p:nvPr/>
+            </p:nvSpPr>
+            <p:spPr>
+              <a:xfrm>
+                <a:off x="1620667" y="2746505"/>
+                <a:ext cx="5135380" cy="1185068"/>
+              </a:xfrm>
+              <a:prstGeom prst="rect">
+                <a:avLst/>
+              </a:prstGeom>
+              <a:blipFill rotWithShape="1">
+                <a:blip r:embed="rId6"/>
+                <a:stretch>
+                  <a:fillRect/>
+                </a:stretch>
+              </a:blipFill>
+            </p:spPr>
+            <p:txBody>
+              <a:bodyPr/>
+              <a:lstStyle/>
+              <a:p>
+                <a:r>
+                  <a:rPr lang="en-US">
+                    <a:noFill/>
+                  </a:rPr>
+                  <a:t> </a:t>
+                </a:r>
+              </a:p>
+            </p:txBody>
+          </p:sp>
+        </mc:Fallback>
+      </mc:AlternateContent>
+      <p:sp>
+        <p:nvSpPr>
+          <p:cNvPr id="27" name="TextBox 26"/>
+          <p:cNvSpPr txBox="1"/>
+          <p:nvPr/>
+        </p:nvSpPr>
+        <p:spPr>
+          <a:xfrm>
+            <a:off x="3456878" y="356839"/>
+            <a:ext cx="5143202" cy="369332"/>
+          </a:xfrm>
+          <a:prstGeom prst="rect">
+            <a:avLst/>
+          </a:prstGeom>
+          <a:noFill/>
+        </p:spPr>
+        <p:txBody>
+          <a:bodyPr wrap="square" rtlCol="0">
+            <a:spAutoFit/>
+          </a:bodyPr>
+          <a:lstStyle/>
+          <a:p>
+            <a:r>
+              <a:rPr lang="en-US" dirty="0" err="1" smtClean="0"/>
+              <a:t>salman</a:t>
+            </a:r>
+            <a:endParaRPr lang="en-US" dirty="0"/>
+          </a:p>
+        </p:txBody>
+      </p:sp>
+    </p:spTree>
+    <p:extLst>
+      <p:ext uri="{BB962C8B-B14F-4D97-AF65-F5344CB8AC3E}">
+        <p14:creationId xmlns:p14="http://schemas.microsoft.com/office/powerpoint/2010/main" val="2104084818"/>
+      </p:ext>
+    </p:extLst>
+  </p:cSld>
+  <p:clrMapOvr>
+    <a:masterClrMapping/>
+  </p:clrMapOvr>
+  <p:timing>
+    <p:tnLst>
+      <p:par>
+        <p:cTn id="1" dur="indefinite" restart="never" nodeType="tmRoot"/>
+      </p:par>
+    </p:tnLst>
+  </p:timing>
+</p:sld>
+</file>
+
+<file path=ppt/slides/slide16.xml><?xml version="1.0" encoding="utf-8"?>
+<p:sld xmlns:a="http://schemas.openxmlformats.org/drawingml/2006/main" xmlns:r="http://schemas.openxmlformats.org/officeDocument/2006/relationships" xmlns:p="http://schemas.openxmlformats.org/presentationml/2006/main">
+  <p:cSld>
+    <p:spTree>
+      <p:nvGrpSpPr>
+        <p:cNvPr id="1" name=""/>
+        <p:cNvGrpSpPr/>
+        <p:nvPr/>
+      </p:nvGrpSpPr>
+      <p:grpSpPr>
+        <a:xfrm>
+          <a:off x="0" y="0"/>
+          <a:ext cx="0" cy="0"/>
+          <a:chOff x="0" y="0"/>
+          <a:chExt cx="0" cy="0"/>
+        </a:xfrm>
+      </p:grpSpPr>
       <p:pic>
         <p:nvPicPr>
           <p:cNvPr id="5" name="Picture 4"/>
@@ -14251,7 +16731,7 @@
                             <a:solidFill>
                               <a:prstClr val="black"/>
                             </a:solidFill>
-                            <a:latin typeface="Cambria Math" panose="02040503050406030204" pitchFamily="18" charset="0"/>
+                            <a:latin typeface="Cambria Math"/>
                           </a:rPr>
                         </m:ctrlPr>
                       </m:sSubPr>
@@ -14303,7 +16783,7 @@
                             <a:solidFill>
                               <a:prstClr val="black"/>
                             </a:solidFill>
-                            <a:latin typeface="Cambria Math" panose="02040503050406030204" pitchFamily="18" charset="0"/>
+                            <a:latin typeface="Cambria Math"/>
                           </a:rPr>
                         </m:ctrlPr>
                       </m:dPr>
@@ -14334,7 +16814,7 @@
                       <m:dPr>
                         <m:ctrlPr>
                           <a:rPr lang="en-US" sz="2400" i="1" dirty="0" smtClean="0">
-                            <a:latin typeface="Cambria Math" panose="02040503050406030204" pitchFamily="18" charset="0"/>
+                            <a:latin typeface="Cambria Math"/>
                           </a:rPr>
                         </m:ctrlPr>
                       </m:dPr>
@@ -14343,7 +16823,7 @@
                           <m:fPr>
                             <m:ctrlPr>
                               <a:rPr lang="en-US" sz="2400" i="1" dirty="0" smtClean="0">
-                                <a:latin typeface="Cambria Math" panose="02040503050406030204" pitchFamily="18" charset="0"/>
+                                <a:latin typeface="Cambria Math"/>
                               </a:rPr>
                             </m:ctrlPr>
                           </m:fPr>
@@ -14366,7 +16846,7 @@
                               <m:sSupPr>
                                 <m:ctrlPr>
                                   <a:rPr lang="en-US" sz="2400" b="0" i="1" dirty="0" smtClean="0">
-                                    <a:latin typeface="Cambria Math" panose="02040503050406030204" pitchFamily="18" charset="0"/>
+                                    <a:latin typeface="Cambria Math"/>
                                   </a:rPr>
                                 </m:ctrlPr>
                               </m:sSupPr>
@@ -14758,7 +17238,7 @@
                               <a:solidFill>
                                 <a:prstClr val="black"/>
                               </a:solidFill>
-                              <a:latin typeface="Cambria Math" panose="02040503050406030204" pitchFamily="18" charset="0"/>
+                              <a:latin typeface="Cambria Math"/>
                             </a:rPr>
                           </m:ctrlPr>
                         </m:sSubPr>
@@ -14810,7 +17290,7 @@
                               <a:solidFill>
                                 <a:prstClr val="black"/>
                               </a:solidFill>
-                              <a:latin typeface="Cambria Math" panose="02040503050406030204" pitchFamily="18" charset="0"/>
+                              <a:latin typeface="Cambria Math"/>
                             </a:rPr>
                           </m:ctrlPr>
                         </m:dPr>
@@ -14851,7 +17331,7 @@
                               <a:solidFill>
                                 <a:prstClr val="black"/>
                               </a:solidFill>
-                              <a:latin typeface="Cambria Math" panose="02040503050406030204" pitchFamily="18" charset="0"/>
+                              <a:latin typeface="Cambria Math"/>
                             </a:rPr>
                           </m:ctrlPr>
                         </m:dPr>
@@ -14919,7 +17399,7 @@
                               <a:solidFill>
                                 <a:prstClr val="black"/>
                               </a:solidFill>
-                              <a:latin typeface="Cambria Math" panose="02040503050406030204" pitchFamily="18" charset="0"/>
+                              <a:latin typeface="Cambria Math"/>
                             </a:rPr>
                           </m:ctrlPr>
                         </m:dPr>
@@ -15012,7 +17492,7 @@
 </p:sld>
 </file>
 
-<file path=ppt/slides/slide16.xml><?xml version="1.0" encoding="utf-8"?>
+<file path=ppt/slides/slide17.xml><?xml version="1.0" encoding="utf-8"?>
 <p:sld xmlns:a="http://schemas.openxmlformats.org/drawingml/2006/main" xmlns:r="http://schemas.openxmlformats.org/officeDocument/2006/relationships" xmlns:p="http://schemas.openxmlformats.org/presentationml/2006/main">
   <p:cSld>
     <p:spTree>
@@ -15020,7 +17500,7 @@
         <p:cNvPr id="1" name="">
           <a:extLst>
             <a:ext uri="{FF2B5EF4-FFF2-40B4-BE49-F238E27FC236}">
-              <a16:creationId xmlns:a16="http://schemas.microsoft.com/office/drawing/2014/main" id="{56A797CB-0268-3133-8FCE-DA4565E5ED61}"/>
+              <a16:creationId xmlns:a16="http://schemas.microsoft.com/office/drawing/2014/main" xmlns="" id="{56A797CB-0268-3133-8FCE-DA4565E5ED61}"/>
             </a:ext>
           </a:extLst>
         </p:cNvPr>
@@ -15040,7 +17520,7 @@
           <p:cNvPr id="8" name="TextBox 7">
             <a:extLst>
               <a:ext uri="{FF2B5EF4-FFF2-40B4-BE49-F238E27FC236}">
-                <a16:creationId xmlns:a16="http://schemas.microsoft.com/office/drawing/2014/main" id="{4072D0FD-1E04-B940-627A-EA9DA05DCCCD}"/>
+                <a16:creationId xmlns:a16="http://schemas.microsoft.com/office/drawing/2014/main" xmlns="" id="{4072D0FD-1E04-B940-627A-EA9DA05DCCCD}"/>
               </a:ext>
             </a:extLst>
           </p:cNvPr>
@@ -15076,7 +17556,11 @@
           </a:lstStyle>
           <a:p>
             <a:r>
-              <a:rPr lang="en-GB" dirty="0"/>
+              <a:rPr lang="en-GB" dirty="0">
+                <a:solidFill>
+                  <a:srgbClr val="00B050"/>
+                </a:solidFill>
+              </a:rPr>
               <a:t>Answer the following questions using ChatGPT</a:t>
             </a:r>
           </a:p>
@@ -15087,7 +17571,7 @@
           <p:cNvPr id="11" name="Rectangle 3">
             <a:extLst>
               <a:ext uri="{FF2B5EF4-FFF2-40B4-BE49-F238E27FC236}">
-                <a16:creationId xmlns:a16="http://schemas.microsoft.com/office/drawing/2014/main" id="{CD85C347-A663-4C54-28B7-AD7070B58688}"/>
+                <a16:creationId xmlns:a16="http://schemas.microsoft.com/office/drawing/2014/main" xmlns="" id="{CD85C347-A663-4C54-28B7-AD7070B58688}"/>
               </a:ext>
             </a:extLst>
           </p:cNvPr>
@@ -15480,7 +17964,7 @@
 </p:sld>
 </file>
 
-<file path=ppt/slides/slide17.xml><?xml version="1.0" encoding="utf-8"?>
+<file path=ppt/slides/slide18.xml><?xml version="1.0" encoding="utf-8"?>
 <p:sld xmlns:a="http://schemas.openxmlformats.org/drawingml/2006/main" xmlns:r="http://schemas.openxmlformats.org/officeDocument/2006/relationships" xmlns:p="http://schemas.openxmlformats.org/presentationml/2006/main">
   <p:cSld>
     <p:spTree>
@@ -15509,7 +17993,7 @@
         </p:nvSpPr>
         <p:spPr>
           <a:xfrm>
-            <a:off x="834583" y="4431761"/>
+            <a:off x="752287" y="4442912"/>
             <a:ext cx="10972800" cy="3200876"/>
           </a:xfrm>
         </p:spPr>
@@ -15523,7 +18007,7 @@
             <a:r>
               <a:rPr lang="en-US" sz="4000" b="1" dirty="0">
                 <a:solidFill>
-                  <a:srgbClr val="0000CC"/>
+                  <a:srgbClr val="00B050"/>
                 </a:solidFill>
                 <a:latin typeface="Cambria" panose="02040503050406030204" pitchFamily="18" charset="0"/>
               </a:rPr>
@@ -15603,7 +18087,7 @@
           <p:cNvPr id="3" name="TextBox 2">
             <a:extLst>
               <a:ext uri="{FF2B5EF4-FFF2-40B4-BE49-F238E27FC236}">
-                <a16:creationId xmlns:a16="http://schemas.microsoft.com/office/drawing/2014/main" id="{D8BEBB93-BF06-6A46-1070-A2F428228B2E}"/>
+                <a16:creationId xmlns:a16="http://schemas.microsoft.com/office/drawing/2014/main" xmlns="" id="{D8BEBB93-BF06-6A46-1070-A2F428228B2E}"/>
               </a:ext>
             </a:extLst>
           </p:cNvPr>
@@ -15639,7 +18123,11 @@
           </a:lstStyle>
           <a:p>
             <a:r>
-              <a:rPr lang="en-GB" dirty="0"/>
+              <a:rPr lang="en-GB" dirty="0">
+                <a:solidFill>
+                  <a:srgbClr val="00B050"/>
+                </a:solidFill>
+              </a:rPr>
               <a:t>Summary</a:t>
             </a:r>
           </a:p>
@@ -15650,7 +18138,7 @@
           <p:cNvPr id="4" name="Rectangle 3">
             <a:extLst>
               <a:ext uri="{FF2B5EF4-FFF2-40B4-BE49-F238E27FC236}">
-                <a16:creationId xmlns:a16="http://schemas.microsoft.com/office/drawing/2014/main" id="{1032A7C6-214E-21D6-A395-0CC71BAD27CA}"/>
+                <a16:creationId xmlns:a16="http://schemas.microsoft.com/office/drawing/2014/main" xmlns="" id="{1032A7C6-214E-21D6-A395-0CC71BAD27CA}"/>
               </a:ext>
             </a:extLst>
           </p:cNvPr>
@@ -16001,7 +18489,7 @@
         <p:spPr>
           <a:xfrm>
             <a:off x="387464" y="558856"/>
-            <a:ext cx="4834261" cy="901465"/>
+            <a:ext cx="4834261" cy="1015663"/>
           </a:xfrm>
           <a:prstGeom prst="rect">
             <a:avLst/>
@@ -16037,7 +18525,7 @@
                   <a:noFill/>
                 </a:ln>
                 <a:solidFill>
-                  <a:srgbClr val="0000FF"/>
+                  <a:srgbClr val="00B050"/>
                 </a:solidFill>
                 <a:effectLst/>
                 <a:uLnTx/>
@@ -16415,7 +18903,7 @@
                   <a:noFill/>
                 </a:ln>
                 <a:solidFill>
-                  <a:srgbClr val="0000FF"/>
+                  <a:srgbClr val="00B050"/>
                 </a:solidFill>
                 <a:effectLst/>
                 <a:uLnTx/>
@@ -16742,7 +19230,7 @@
           <p:cNvPr id="5" name="مربع نص 1">
             <a:extLst>
               <a:ext uri="{FF2B5EF4-FFF2-40B4-BE49-F238E27FC236}">
-                <a16:creationId xmlns:a16="http://schemas.microsoft.com/office/drawing/2014/main" id="{7711DB52-DA0E-C95D-DFAF-CCC7BD2BE49D}"/>
+                <a16:creationId xmlns:a16="http://schemas.microsoft.com/office/drawing/2014/main" xmlns="" id="{7711DB52-DA0E-C95D-DFAF-CCC7BD2BE49D}"/>
               </a:ext>
             </a:extLst>
           </p:cNvPr>
@@ -16788,7 +19276,7 @@
                   <a:noFill/>
                 </a:ln>
                 <a:solidFill>
-                  <a:srgbClr val="0000FF"/>
+                  <a:srgbClr val="00B050"/>
                 </a:solidFill>
                 <a:effectLst/>
                 <a:uLnTx/>
@@ -16807,7 +19295,7 @@
           <p:cNvPr id="6" name="TextBox 5">
             <a:extLst>
               <a:ext uri="{FF2B5EF4-FFF2-40B4-BE49-F238E27FC236}">
-                <a16:creationId xmlns:a16="http://schemas.microsoft.com/office/drawing/2014/main" id="{C6E955C2-410D-5EE0-CFAB-8FE55D451121}"/>
+                <a16:creationId xmlns:a16="http://schemas.microsoft.com/office/drawing/2014/main" xmlns="" id="{C6E955C2-410D-5EE0-CFAB-8FE55D451121}"/>
               </a:ext>
             </a:extLst>
           </p:cNvPr>
@@ -17011,7 +19499,7 @@
             <a:r>
               <a:rPr lang="en-US" sz="4000" b="1" dirty="0">
                 <a:solidFill>
-                  <a:srgbClr val="0000FF"/>
+                  <a:srgbClr val="00B050"/>
                 </a:solidFill>
                 <a:latin typeface="Cambria" panose="02040503050406030204" pitchFamily="18" charset="0"/>
                 <a:ea typeface="Cambria" panose="02040503050406030204" pitchFamily="18" charset="0"/>
@@ -17347,7 +19835,7 @@
             <a:r>
               <a:rPr lang="en-US" altLang="en-US" sz="2800" b="1" dirty="0">
                 <a:solidFill>
-                  <a:srgbClr val="0000FF"/>
+                  <a:srgbClr val="00B050"/>
                 </a:solidFill>
                 <a:latin typeface="Times New Roman" panose="02020603050405020304" pitchFamily="18" charset="0"/>
                 <a:cs typeface="Times New Roman" panose="02020603050405020304" pitchFamily="18" charset="0"/>
@@ -17985,7 +20473,7 @@
             <a:r>
               <a:rPr lang="en-US" sz="2800" b="1" dirty="0">
                 <a:solidFill>
-                  <a:srgbClr val="0000FF"/>
+                  <a:srgbClr val="00B050"/>
                 </a:solidFill>
                 <a:latin typeface="Cambria" pitchFamily="18" charset="0"/>
               </a:rPr>
@@ -19365,7 +21853,11 @@
           </a:lstStyle>
           <a:p>
             <a:r>
-              <a:rPr lang="en-US" altLang="en-US" dirty="0"/>
+              <a:rPr lang="en-US" altLang="en-US" dirty="0">
+                <a:solidFill>
+                  <a:srgbClr val="00B050"/>
+                </a:solidFill>
+              </a:rPr>
               <a:t>How to express a sinusoidal varying function ?</a:t>
             </a:r>
           </a:p>
@@ -21600,7 +24092,7 @@
           <a:p>
             <a:pPr eaLnBrk="1" hangingPunct="1"/>
             <a:r>
-              <a:rPr lang="en-US" altLang="en-US" sz="2800" b="1">
+              <a:rPr lang="en-US" altLang="en-US" sz="2800" b="1" dirty="0">
                 <a:solidFill>
                   <a:srgbClr val="CC3300"/>
                 </a:solidFill>
@@ -23351,7 +25843,7 @@
             <a:r>
               <a:rPr lang="en-US" altLang="en-US" sz="2800" b="1" dirty="0">
                 <a:solidFill>
-                  <a:srgbClr val="0000FF"/>
+                  <a:srgbClr val="00B050"/>
                 </a:solidFill>
                 <a:latin typeface="Cambria" panose="02040503050406030204" pitchFamily="18" charset="0"/>
               </a:rPr>
@@ -23359,6 +25851,9 @@
             </a:r>
             <a:r>
               <a:rPr lang="en-US" altLang="en-US" sz="2800" b="1" i="1" dirty="0">
+                <a:solidFill>
+                  <a:srgbClr val="00B050"/>
+                </a:solidFill>
                 <a:latin typeface="Cambria" panose="02040503050406030204" pitchFamily="18" charset="0"/>
               </a:rPr>
               <a:t> </a:t>
@@ -23366,7 +25861,7 @@
             <a:r>
               <a:rPr lang="en-US" altLang="en-US" sz="2800" b="1" dirty="0">
                 <a:solidFill>
-                  <a:srgbClr val="0000FF"/>
+                  <a:srgbClr val="00B050"/>
                 </a:solidFill>
                 <a:latin typeface="Cambria" panose="02040503050406030204" pitchFamily="18" charset="0"/>
               </a:rPr>
@@ -23374,6 +25869,9 @@
             </a:r>
             <a:r>
               <a:rPr lang="en-US" altLang="en-US" sz="2800" b="1" i="1" dirty="0">
+                <a:solidFill>
+                  <a:srgbClr val="00B050"/>
+                </a:solidFill>
                 <a:latin typeface="Cambria" panose="02040503050406030204" pitchFamily="18" charset="0"/>
               </a:rPr>
               <a:t> </a:t>
@@ -23381,7 +25879,7 @@
             <a:r>
               <a:rPr lang="en-US" altLang="en-US" sz="2800" b="1" dirty="0">
                 <a:solidFill>
-                  <a:srgbClr val="0000FF"/>
+                  <a:srgbClr val="00B050"/>
                 </a:solidFill>
                 <a:latin typeface="Cambria" panose="02040503050406030204" pitchFamily="18" charset="0"/>
               </a:rPr>
@@ -23389,6 +25887,9 @@
             </a:r>
             <a:r>
               <a:rPr lang="en-US" altLang="en-US" sz="2800" b="1" i="1" dirty="0">
+                <a:solidFill>
+                  <a:srgbClr val="00B050"/>
+                </a:solidFill>
                 <a:latin typeface="Cambria" panose="02040503050406030204" pitchFamily="18" charset="0"/>
               </a:rPr>
               <a:t> </a:t>
@@ -23396,7 +25897,7 @@
             <a:r>
               <a:rPr lang="en-US" altLang="en-US" sz="2800" b="1" dirty="0">
                 <a:solidFill>
-                  <a:srgbClr val="0000FF"/>
+                  <a:srgbClr val="00B050"/>
                 </a:solidFill>
                 <a:latin typeface="Cambria" panose="02040503050406030204" pitchFamily="18" charset="0"/>
               </a:rPr>
@@ -24277,7 +26778,7 @@
             <a:r>
               <a:rPr lang="en-US" altLang="en-US" sz="2800" b="1" dirty="0">
                 <a:solidFill>
-                  <a:srgbClr val="0000FF"/>
+                  <a:srgbClr val="00B050"/>
                 </a:solidFill>
                 <a:latin typeface="Cambria" panose="02040503050406030204" pitchFamily="18" charset="0"/>
               </a:rPr>
@@ -27951,7 +30452,7 @@
   <a:extraClrSchemeLst/>
   <a:extLst>
     <a:ext uri="{05A4C25C-085E-4340-85A3-A5531E510DB2}">
-      <thm15:themeFamily xmlns:thm15="http://schemas.microsoft.com/office/thememl/2012/main" name="Office Theme" id="{62F939B6-93AF-4DB8-9C6B-D6C7DFDC589F}" vid="{4A3C46E8-61CC-4603-A589-7422A47A8E4A}"/>
+      <thm15:themeFamily xmlns:thm15="http://schemas.microsoft.com/office/thememl/2012/main" xmlns="" name="Office Theme" id="{62F939B6-93AF-4DB8-9C6B-D6C7DFDC589F}" vid="{4A3C46E8-61CC-4603-A589-7422A47A8E4A}"/>
     </a:ext>
   </a:extLst>
 </a:theme>

</xml_diff>